<commit_message>
classdiagram pdf & menu typo
</commit_message>
<xml_diff>
--- a/menu.ver0.4.pptx
+++ b/menu.ver0.4.pptx
@@ -223,7 +223,7 @@
           <a:p>
             <a:fld id="{9A409D41-453F-462B-9136-EBE223218BC9}" type="datetimeFigureOut">
               <a:rPr lang="ko-KR" altLang="en-US" smtClean="0"/>
-              <a:t>2020-01-22</a:t>
+              <a:t>2020-01-28</a:t>
             </a:fld>
             <a:endParaRPr lang="ko-KR" altLang="en-US"/>
           </a:p>
@@ -287,38 +287,37 @@
           <a:p>
             <a:pPr lvl="0"/>
             <a:r>
-              <a:rPr lang="ko-KR" altLang="en-US" smtClean="0"/>
+              <a:rPr lang="ko-KR" altLang="en-US"/>
               <a:t>마스터 텍스트 스타일을 편집합니다</a:t>
             </a:r>
           </a:p>
           <a:p>
             <a:pPr lvl="1"/>
             <a:r>
-              <a:rPr lang="ko-KR" altLang="en-US" smtClean="0"/>
+              <a:rPr lang="ko-KR" altLang="en-US"/>
               <a:t>둘째 수준</a:t>
             </a:r>
           </a:p>
           <a:p>
             <a:pPr lvl="2"/>
             <a:r>
-              <a:rPr lang="ko-KR" altLang="en-US" smtClean="0"/>
+              <a:rPr lang="ko-KR" altLang="en-US"/>
               <a:t>셋째 수준</a:t>
             </a:r>
           </a:p>
           <a:p>
             <a:pPr lvl="3"/>
             <a:r>
-              <a:rPr lang="ko-KR" altLang="en-US" smtClean="0"/>
+              <a:rPr lang="ko-KR" altLang="en-US"/>
               <a:t>넷째 수준</a:t>
             </a:r>
           </a:p>
           <a:p>
             <a:pPr lvl="4"/>
             <a:r>
-              <a:rPr lang="ko-KR" altLang="en-US" smtClean="0"/>
+              <a:rPr lang="ko-KR" altLang="en-US"/>
               <a:t>다섯째 수준</a:t>
             </a:r>
-            <a:endParaRPr lang="ko-KR" altLang="en-US"/>
           </a:p>
         </p:txBody>
       </p:sp>
@@ -613,10 +612,9 @@
           <a:lstStyle/>
           <a:p>
             <a:r>
-              <a:rPr lang="ko-KR" altLang="en-US" smtClean="0"/>
+              <a:rPr lang="ko-KR" altLang="en-US"/>
               <a:t>마스터 제목 스타일 편집</a:t>
             </a:r>
-            <a:endParaRPr lang="ko-KR" altLang="en-US"/>
           </a:p>
         </p:txBody>
       </p:sp>
@@ -732,10 +730,9 @@
           </a:lstStyle>
           <a:p>
             <a:r>
-              <a:rPr lang="ko-KR" altLang="en-US" smtClean="0"/>
+              <a:rPr lang="ko-KR" altLang="en-US"/>
               <a:t>마스터 부제목 스타일 편집</a:t>
             </a:r>
-            <a:endParaRPr lang="ko-KR" altLang="en-US"/>
           </a:p>
         </p:txBody>
       </p:sp>
@@ -756,7 +753,7 @@
           <a:p>
             <a:fld id="{388ED953-9DB3-4386-BC67-F5551596A4FF}" type="datetimeFigureOut">
               <a:rPr lang="ko-KR" altLang="en-US" smtClean="0"/>
-              <a:t>2020-01-22</a:t>
+              <a:t>2020-01-28</a:t>
             </a:fld>
             <a:endParaRPr lang="ko-KR" altLang="en-US"/>
           </a:p>
@@ -850,10 +847,9 @@
           <a:lstStyle/>
           <a:p>
             <a:r>
-              <a:rPr lang="ko-KR" altLang="en-US" smtClean="0"/>
+              <a:rPr lang="ko-KR" altLang="en-US"/>
               <a:t>마스터 제목 스타일 편집</a:t>
             </a:r>
-            <a:endParaRPr lang="ko-KR" altLang="en-US"/>
           </a:p>
         </p:txBody>
       </p:sp>
@@ -874,38 +870,37 @@
           <a:p>
             <a:pPr lvl="0"/>
             <a:r>
-              <a:rPr lang="ko-KR" altLang="en-US" smtClean="0"/>
+              <a:rPr lang="ko-KR" altLang="en-US"/>
               <a:t>마스터 텍스트 스타일을 편집합니다</a:t>
             </a:r>
           </a:p>
           <a:p>
             <a:pPr lvl="1"/>
             <a:r>
-              <a:rPr lang="ko-KR" altLang="en-US" smtClean="0"/>
+              <a:rPr lang="ko-KR" altLang="en-US"/>
               <a:t>둘째 수준</a:t>
             </a:r>
           </a:p>
           <a:p>
             <a:pPr lvl="2"/>
             <a:r>
-              <a:rPr lang="ko-KR" altLang="en-US" smtClean="0"/>
+              <a:rPr lang="ko-KR" altLang="en-US"/>
               <a:t>셋째 수준</a:t>
             </a:r>
           </a:p>
           <a:p>
             <a:pPr lvl="3"/>
             <a:r>
-              <a:rPr lang="ko-KR" altLang="en-US" smtClean="0"/>
+              <a:rPr lang="ko-KR" altLang="en-US"/>
               <a:t>넷째 수준</a:t>
             </a:r>
           </a:p>
           <a:p>
             <a:pPr lvl="4"/>
             <a:r>
-              <a:rPr lang="ko-KR" altLang="en-US" smtClean="0"/>
+              <a:rPr lang="ko-KR" altLang="en-US"/>
               <a:t>다섯째 수준</a:t>
             </a:r>
-            <a:endParaRPr lang="ko-KR" altLang="en-US"/>
           </a:p>
         </p:txBody>
       </p:sp>
@@ -926,7 +921,7 @@
           <a:p>
             <a:fld id="{388ED953-9DB3-4386-BC67-F5551596A4FF}" type="datetimeFigureOut">
               <a:rPr lang="ko-KR" altLang="en-US" smtClean="0"/>
-              <a:t>2020-01-22</a:t>
+              <a:t>2020-01-28</a:t>
             </a:fld>
             <a:endParaRPr lang="ko-KR" altLang="en-US"/>
           </a:p>
@@ -1025,10 +1020,9 @@
           <a:lstStyle/>
           <a:p>
             <a:r>
-              <a:rPr lang="ko-KR" altLang="en-US" smtClean="0"/>
+              <a:rPr lang="ko-KR" altLang="en-US"/>
               <a:t>마스터 제목 스타일 편집</a:t>
             </a:r>
-            <a:endParaRPr lang="ko-KR" altLang="en-US"/>
           </a:p>
         </p:txBody>
       </p:sp>
@@ -1054,38 +1048,37 @@
           <a:p>
             <a:pPr lvl="0"/>
             <a:r>
-              <a:rPr lang="ko-KR" altLang="en-US" smtClean="0"/>
+              <a:rPr lang="ko-KR" altLang="en-US"/>
               <a:t>마스터 텍스트 스타일을 편집합니다</a:t>
             </a:r>
           </a:p>
           <a:p>
             <a:pPr lvl="1"/>
             <a:r>
-              <a:rPr lang="ko-KR" altLang="en-US" smtClean="0"/>
+              <a:rPr lang="ko-KR" altLang="en-US"/>
               <a:t>둘째 수준</a:t>
             </a:r>
           </a:p>
           <a:p>
             <a:pPr lvl="2"/>
             <a:r>
-              <a:rPr lang="ko-KR" altLang="en-US" smtClean="0"/>
+              <a:rPr lang="ko-KR" altLang="en-US"/>
               <a:t>셋째 수준</a:t>
             </a:r>
           </a:p>
           <a:p>
             <a:pPr lvl="3"/>
             <a:r>
-              <a:rPr lang="ko-KR" altLang="en-US" smtClean="0"/>
+              <a:rPr lang="ko-KR" altLang="en-US"/>
               <a:t>넷째 수준</a:t>
             </a:r>
           </a:p>
           <a:p>
             <a:pPr lvl="4"/>
             <a:r>
-              <a:rPr lang="ko-KR" altLang="en-US" smtClean="0"/>
+              <a:rPr lang="ko-KR" altLang="en-US"/>
               <a:t>다섯째 수준</a:t>
             </a:r>
-            <a:endParaRPr lang="ko-KR" altLang="en-US"/>
           </a:p>
         </p:txBody>
       </p:sp>
@@ -1106,7 +1099,7 @@
           <a:p>
             <a:fld id="{388ED953-9DB3-4386-BC67-F5551596A4FF}" type="datetimeFigureOut">
               <a:rPr lang="ko-KR" altLang="en-US" smtClean="0"/>
-              <a:t>2020-01-22</a:t>
+              <a:t>2020-01-28</a:t>
             </a:fld>
             <a:endParaRPr lang="ko-KR" altLang="en-US"/>
           </a:p>
@@ -1200,10 +1193,9 @@
           <a:lstStyle/>
           <a:p>
             <a:r>
-              <a:rPr lang="ko-KR" altLang="en-US" smtClean="0"/>
+              <a:rPr lang="ko-KR" altLang="en-US"/>
               <a:t>마스터 제목 스타일 편집</a:t>
             </a:r>
-            <a:endParaRPr lang="ko-KR" altLang="en-US"/>
           </a:p>
         </p:txBody>
       </p:sp>
@@ -1224,38 +1216,37 @@
           <a:p>
             <a:pPr lvl="0"/>
             <a:r>
-              <a:rPr lang="ko-KR" altLang="en-US" smtClean="0"/>
+              <a:rPr lang="ko-KR" altLang="en-US"/>
               <a:t>마스터 텍스트 스타일을 편집합니다</a:t>
             </a:r>
           </a:p>
           <a:p>
             <a:pPr lvl="1"/>
             <a:r>
-              <a:rPr lang="ko-KR" altLang="en-US" smtClean="0"/>
+              <a:rPr lang="ko-KR" altLang="en-US"/>
               <a:t>둘째 수준</a:t>
             </a:r>
           </a:p>
           <a:p>
             <a:pPr lvl="2"/>
             <a:r>
-              <a:rPr lang="ko-KR" altLang="en-US" smtClean="0"/>
+              <a:rPr lang="ko-KR" altLang="en-US"/>
               <a:t>셋째 수준</a:t>
             </a:r>
           </a:p>
           <a:p>
             <a:pPr lvl="3"/>
             <a:r>
-              <a:rPr lang="ko-KR" altLang="en-US" smtClean="0"/>
+              <a:rPr lang="ko-KR" altLang="en-US"/>
               <a:t>넷째 수준</a:t>
             </a:r>
           </a:p>
           <a:p>
             <a:pPr lvl="4"/>
             <a:r>
-              <a:rPr lang="ko-KR" altLang="en-US" smtClean="0"/>
+              <a:rPr lang="ko-KR" altLang="en-US"/>
               <a:t>다섯째 수준</a:t>
             </a:r>
-            <a:endParaRPr lang="ko-KR" altLang="en-US"/>
           </a:p>
         </p:txBody>
       </p:sp>
@@ -1276,7 +1267,7 @@
           <a:p>
             <a:fld id="{388ED953-9DB3-4386-BC67-F5551596A4FF}" type="datetimeFigureOut">
               <a:rPr lang="ko-KR" altLang="en-US" smtClean="0"/>
-              <a:t>2020-01-22</a:t>
+              <a:t>2020-01-28</a:t>
             </a:fld>
             <a:endParaRPr lang="ko-KR" altLang="en-US"/>
           </a:p>
@@ -1379,10 +1370,9 @@
           </a:lstStyle>
           <a:p>
             <a:r>
-              <a:rPr lang="ko-KR" altLang="en-US" smtClean="0"/>
+              <a:rPr lang="ko-KR" altLang="en-US"/>
               <a:t>마스터 제목 스타일 편집</a:t>
             </a:r>
-            <a:endParaRPr lang="ko-KR" altLang="en-US"/>
           </a:p>
         </p:txBody>
       </p:sp>
@@ -1499,7 +1489,7 @@
           <a:p>
             <a:pPr lvl="0"/>
             <a:r>
-              <a:rPr lang="ko-KR" altLang="en-US" smtClean="0"/>
+              <a:rPr lang="ko-KR" altLang="en-US"/>
               <a:t>마스터 텍스트 스타일을 편집합니다</a:t>
             </a:r>
           </a:p>
@@ -1522,7 +1512,7 @@
           <a:p>
             <a:fld id="{388ED953-9DB3-4386-BC67-F5551596A4FF}" type="datetimeFigureOut">
               <a:rPr lang="ko-KR" altLang="en-US" smtClean="0"/>
-              <a:t>2020-01-22</a:t>
+              <a:t>2020-01-28</a:t>
             </a:fld>
             <a:endParaRPr lang="ko-KR" altLang="en-US"/>
           </a:p>
@@ -1616,10 +1606,9 @@
           <a:lstStyle/>
           <a:p>
             <a:r>
-              <a:rPr lang="ko-KR" altLang="en-US" smtClean="0"/>
+              <a:rPr lang="ko-KR" altLang="en-US"/>
               <a:t>마스터 제목 스타일 편집</a:t>
             </a:r>
-            <a:endParaRPr lang="ko-KR" altLang="en-US"/>
           </a:p>
         </p:txBody>
       </p:sp>
@@ -1673,38 +1662,37 @@
           <a:p>
             <a:pPr lvl="0"/>
             <a:r>
-              <a:rPr lang="ko-KR" altLang="en-US" smtClean="0"/>
+              <a:rPr lang="ko-KR" altLang="en-US"/>
               <a:t>마스터 텍스트 스타일을 편집합니다</a:t>
             </a:r>
           </a:p>
           <a:p>
             <a:pPr lvl="1"/>
             <a:r>
-              <a:rPr lang="ko-KR" altLang="en-US" smtClean="0"/>
+              <a:rPr lang="ko-KR" altLang="en-US"/>
               <a:t>둘째 수준</a:t>
             </a:r>
           </a:p>
           <a:p>
             <a:pPr lvl="2"/>
             <a:r>
-              <a:rPr lang="ko-KR" altLang="en-US" smtClean="0"/>
+              <a:rPr lang="ko-KR" altLang="en-US"/>
               <a:t>셋째 수준</a:t>
             </a:r>
           </a:p>
           <a:p>
             <a:pPr lvl="3"/>
             <a:r>
-              <a:rPr lang="ko-KR" altLang="en-US" smtClean="0"/>
+              <a:rPr lang="ko-KR" altLang="en-US"/>
               <a:t>넷째 수준</a:t>
             </a:r>
           </a:p>
           <a:p>
             <a:pPr lvl="4"/>
             <a:r>
-              <a:rPr lang="ko-KR" altLang="en-US" smtClean="0"/>
+              <a:rPr lang="ko-KR" altLang="en-US"/>
               <a:t>다섯째 수준</a:t>
             </a:r>
-            <a:endParaRPr lang="ko-KR" altLang="en-US"/>
           </a:p>
         </p:txBody>
       </p:sp>
@@ -1758,38 +1746,37 @@
           <a:p>
             <a:pPr lvl="0"/>
             <a:r>
-              <a:rPr lang="ko-KR" altLang="en-US" smtClean="0"/>
+              <a:rPr lang="ko-KR" altLang="en-US"/>
               <a:t>마스터 텍스트 스타일을 편집합니다</a:t>
             </a:r>
           </a:p>
           <a:p>
             <a:pPr lvl="1"/>
             <a:r>
-              <a:rPr lang="ko-KR" altLang="en-US" smtClean="0"/>
+              <a:rPr lang="ko-KR" altLang="en-US"/>
               <a:t>둘째 수준</a:t>
             </a:r>
           </a:p>
           <a:p>
             <a:pPr lvl="2"/>
             <a:r>
-              <a:rPr lang="ko-KR" altLang="en-US" smtClean="0"/>
+              <a:rPr lang="ko-KR" altLang="en-US"/>
               <a:t>셋째 수준</a:t>
             </a:r>
           </a:p>
           <a:p>
             <a:pPr lvl="3"/>
             <a:r>
-              <a:rPr lang="ko-KR" altLang="en-US" smtClean="0"/>
+              <a:rPr lang="ko-KR" altLang="en-US"/>
               <a:t>넷째 수준</a:t>
             </a:r>
           </a:p>
           <a:p>
             <a:pPr lvl="4"/>
             <a:r>
-              <a:rPr lang="ko-KR" altLang="en-US" smtClean="0"/>
+              <a:rPr lang="ko-KR" altLang="en-US"/>
               <a:t>다섯째 수준</a:t>
             </a:r>
-            <a:endParaRPr lang="ko-KR" altLang="en-US"/>
           </a:p>
         </p:txBody>
       </p:sp>
@@ -1810,7 +1797,7 @@
           <a:p>
             <a:fld id="{388ED953-9DB3-4386-BC67-F5551596A4FF}" type="datetimeFigureOut">
               <a:rPr lang="ko-KR" altLang="en-US" smtClean="0"/>
-              <a:t>2020-01-22</a:t>
+              <a:t>2020-01-28</a:t>
             </a:fld>
             <a:endParaRPr lang="ko-KR" altLang="en-US"/>
           </a:p>
@@ -1908,10 +1895,9 @@
           </a:lstStyle>
           <a:p>
             <a:r>
-              <a:rPr lang="ko-KR" altLang="en-US" smtClean="0"/>
+              <a:rPr lang="ko-KR" altLang="en-US"/>
               <a:t>마스터 제목 스타일 편집</a:t>
             </a:r>
-            <a:endParaRPr lang="ko-KR" altLang="en-US"/>
           </a:p>
         </p:txBody>
       </p:sp>
@@ -1974,7 +1960,7 @@
           <a:p>
             <a:pPr lvl="0"/>
             <a:r>
-              <a:rPr lang="ko-KR" altLang="en-US" smtClean="0"/>
+              <a:rPr lang="ko-KR" altLang="en-US"/>
               <a:t>마스터 텍스트 스타일을 편집합니다</a:t>
             </a:r>
           </a:p>
@@ -2030,38 +2016,37 @@
           <a:p>
             <a:pPr lvl="0"/>
             <a:r>
-              <a:rPr lang="ko-KR" altLang="en-US" smtClean="0"/>
+              <a:rPr lang="ko-KR" altLang="en-US"/>
               <a:t>마스터 텍스트 스타일을 편집합니다</a:t>
             </a:r>
           </a:p>
           <a:p>
             <a:pPr lvl="1"/>
             <a:r>
-              <a:rPr lang="ko-KR" altLang="en-US" smtClean="0"/>
+              <a:rPr lang="ko-KR" altLang="en-US"/>
               <a:t>둘째 수준</a:t>
             </a:r>
           </a:p>
           <a:p>
             <a:pPr lvl="2"/>
             <a:r>
-              <a:rPr lang="ko-KR" altLang="en-US" smtClean="0"/>
+              <a:rPr lang="ko-KR" altLang="en-US"/>
               <a:t>셋째 수준</a:t>
             </a:r>
           </a:p>
           <a:p>
             <a:pPr lvl="3"/>
             <a:r>
-              <a:rPr lang="ko-KR" altLang="en-US" smtClean="0"/>
+              <a:rPr lang="ko-KR" altLang="en-US"/>
               <a:t>넷째 수준</a:t>
             </a:r>
           </a:p>
           <a:p>
             <a:pPr lvl="4"/>
             <a:r>
-              <a:rPr lang="ko-KR" altLang="en-US" smtClean="0"/>
+              <a:rPr lang="ko-KR" altLang="en-US"/>
               <a:t>다섯째 수준</a:t>
             </a:r>
-            <a:endParaRPr lang="ko-KR" altLang="en-US"/>
           </a:p>
         </p:txBody>
       </p:sp>
@@ -2124,7 +2109,7 @@
           <a:p>
             <a:pPr lvl="0"/>
             <a:r>
-              <a:rPr lang="ko-KR" altLang="en-US" smtClean="0"/>
+              <a:rPr lang="ko-KR" altLang="en-US"/>
               <a:t>마스터 텍스트 스타일을 편집합니다</a:t>
             </a:r>
           </a:p>
@@ -2180,38 +2165,37 @@
           <a:p>
             <a:pPr lvl="0"/>
             <a:r>
-              <a:rPr lang="ko-KR" altLang="en-US" smtClean="0"/>
+              <a:rPr lang="ko-KR" altLang="en-US"/>
               <a:t>마스터 텍스트 스타일을 편집합니다</a:t>
             </a:r>
           </a:p>
           <a:p>
             <a:pPr lvl="1"/>
             <a:r>
-              <a:rPr lang="ko-KR" altLang="en-US" smtClean="0"/>
+              <a:rPr lang="ko-KR" altLang="en-US"/>
               <a:t>둘째 수준</a:t>
             </a:r>
           </a:p>
           <a:p>
             <a:pPr lvl="2"/>
             <a:r>
-              <a:rPr lang="ko-KR" altLang="en-US" smtClean="0"/>
+              <a:rPr lang="ko-KR" altLang="en-US"/>
               <a:t>셋째 수준</a:t>
             </a:r>
           </a:p>
           <a:p>
             <a:pPr lvl="3"/>
             <a:r>
-              <a:rPr lang="ko-KR" altLang="en-US" smtClean="0"/>
+              <a:rPr lang="ko-KR" altLang="en-US"/>
               <a:t>넷째 수준</a:t>
             </a:r>
           </a:p>
           <a:p>
             <a:pPr lvl="4"/>
             <a:r>
-              <a:rPr lang="ko-KR" altLang="en-US" smtClean="0"/>
+              <a:rPr lang="ko-KR" altLang="en-US"/>
               <a:t>다섯째 수준</a:t>
             </a:r>
-            <a:endParaRPr lang="ko-KR" altLang="en-US"/>
           </a:p>
         </p:txBody>
       </p:sp>
@@ -2232,7 +2216,7 @@
           <a:p>
             <a:fld id="{388ED953-9DB3-4386-BC67-F5551596A4FF}" type="datetimeFigureOut">
               <a:rPr lang="ko-KR" altLang="en-US" smtClean="0"/>
-              <a:t>2020-01-22</a:t>
+              <a:t>2020-01-28</a:t>
             </a:fld>
             <a:endParaRPr lang="ko-KR" altLang="en-US"/>
           </a:p>
@@ -2326,10 +2310,9 @@
           <a:lstStyle/>
           <a:p>
             <a:r>
-              <a:rPr lang="ko-KR" altLang="en-US" smtClean="0"/>
+              <a:rPr lang="ko-KR" altLang="en-US"/>
               <a:t>마스터 제목 스타일 편집</a:t>
             </a:r>
-            <a:endParaRPr lang="ko-KR" altLang="en-US"/>
           </a:p>
         </p:txBody>
       </p:sp>
@@ -2350,7 +2333,7 @@
           <a:p>
             <a:fld id="{388ED953-9DB3-4386-BC67-F5551596A4FF}" type="datetimeFigureOut">
               <a:rPr lang="ko-KR" altLang="en-US" smtClean="0"/>
-              <a:t>2020-01-22</a:t>
+              <a:t>2020-01-28</a:t>
             </a:fld>
             <a:endParaRPr lang="ko-KR" altLang="en-US"/>
           </a:p>
@@ -2445,7 +2428,7 @@
           <a:p>
             <a:fld id="{388ED953-9DB3-4386-BC67-F5551596A4FF}" type="datetimeFigureOut">
               <a:rPr lang="ko-KR" altLang="en-US" smtClean="0"/>
-              <a:t>2020-01-22</a:t>
+              <a:t>2020-01-28</a:t>
             </a:fld>
             <a:endParaRPr lang="ko-KR" altLang="en-US"/>
           </a:p>
@@ -2548,10 +2531,9 @@
           </a:lstStyle>
           <a:p>
             <a:r>
-              <a:rPr lang="ko-KR" altLang="en-US" smtClean="0"/>
+              <a:rPr lang="ko-KR" altLang="en-US"/>
               <a:t>마스터 제목 스타일 편집</a:t>
             </a:r>
-            <a:endParaRPr lang="ko-KR" altLang="en-US"/>
           </a:p>
         </p:txBody>
       </p:sp>
@@ -2605,38 +2587,37 @@
           <a:p>
             <a:pPr lvl="0"/>
             <a:r>
-              <a:rPr lang="ko-KR" altLang="en-US" smtClean="0"/>
+              <a:rPr lang="ko-KR" altLang="en-US"/>
               <a:t>마스터 텍스트 스타일을 편집합니다</a:t>
             </a:r>
           </a:p>
           <a:p>
             <a:pPr lvl="1"/>
             <a:r>
-              <a:rPr lang="ko-KR" altLang="en-US" smtClean="0"/>
+              <a:rPr lang="ko-KR" altLang="en-US"/>
               <a:t>둘째 수준</a:t>
             </a:r>
           </a:p>
           <a:p>
             <a:pPr lvl="2"/>
             <a:r>
-              <a:rPr lang="ko-KR" altLang="en-US" smtClean="0"/>
+              <a:rPr lang="ko-KR" altLang="en-US"/>
               <a:t>셋째 수준</a:t>
             </a:r>
           </a:p>
           <a:p>
             <a:pPr lvl="3"/>
             <a:r>
-              <a:rPr lang="ko-KR" altLang="en-US" smtClean="0"/>
+              <a:rPr lang="ko-KR" altLang="en-US"/>
               <a:t>넷째 수준</a:t>
             </a:r>
           </a:p>
           <a:p>
             <a:pPr lvl="4"/>
             <a:r>
-              <a:rPr lang="ko-KR" altLang="en-US" smtClean="0"/>
+              <a:rPr lang="ko-KR" altLang="en-US"/>
               <a:t>다섯째 수준</a:t>
             </a:r>
-            <a:endParaRPr lang="ko-KR" altLang="en-US"/>
           </a:p>
         </p:txBody>
       </p:sp>
@@ -2699,7 +2680,7 @@
           <a:p>
             <a:pPr lvl="0"/>
             <a:r>
-              <a:rPr lang="ko-KR" altLang="en-US" smtClean="0"/>
+              <a:rPr lang="ko-KR" altLang="en-US"/>
               <a:t>마스터 텍스트 스타일을 편집합니다</a:t>
             </a:r>
           </a:p>
@@ -2722,7 +2703,7 @@
           <a:p>
             <a:fld id="{388ED953-9DB3-4386-BC67-F5551596A4FF}" type="datetimeFigureOut">
               <a:rPr lang="ko-KR" altLang="en-US" smtClean="0"/>
-              <a:t>2020-01-22</a:t>
+              <a:t>2020-01-28</a:t>
             </a:fld>
             <a:endParaRPr lang="ko-KR" altLang="en-US"/>
           </a:p>
@@ -2825,10 +2806,9 @@
           </a:lstStyle>
           <a:p>
             <a:r>
-              <a:rPr lang="ko-KR" altLang="en-US" smtClean="0"/>
+              <a:rPr lang="ko-KR" altLang="en-US"/>
               <a:t>마스터 제목 스타일 편집</a:t>
             </a:r>
-            <a:endParaRPr lang="ko-KR" altLang="en-US"/>
           </a:p>
         </p:txBody>
       </p:sp>
@@ -2952,7 +2932,7 @@
           <a:p>
             <a:pPr lvl="0"/>
             <a:r>
-              <a:rPr lang="ko-KR" altLang="en-US" smtClean="0"/>
+              <a:rPr lang="ko-KR" altLang="en-US"/>
               <a:t>마스터 텍스트 스타일을 편집합니다</a:t>
             </a:r>
           </a:p>
@@ -2975,7 +2955,7 @@
           <a:p>
             <a:fld id="{388ED953-9DB3-4386-BC67-F5551596A4FF}" type="datetimeFigureOut">
               <a:rPr lang="ko-KR" altLang="en-US" smtClean="0"/>
-              <a:t>2020-01-22</a:t>
+              <a:t>2020-01-28</a:t>
             </a:fld>
             <a:endParaRPr lang="ko-KR" altLang="en-US"/>
           </a:p>
@@ -3087,10 +3067,9 @@
           <a:lstStyle/>
           <a:p>
             <a:r>
-              <a:rPr lang="ko-KR" altLang="en-US" smtClean="0"/>
+              <a:rPr lang="ko-KR" altLang="en-US"/>
               <a:t>마스터 제목 스타일 편집</a:t>
             </a:r>
-            <a:endParaRPr lang="ko-KR" altLang="en-US"/>
           </a:p>
         </p:txBody>
       </p:sp>
@@ -3121,38 +3100,37 @@
           <a:p>
             <a:pPr lvl="0"/>
             <a:r>
-              <a:rPr lang="ko-KR" altLang="en-US" smtClean="0"/>
+              <a:rPr lang="ko-KR" altLang="en-US"/>
               <a:t>마스터 텍스트 스타일을 편집합니다</a:t>
             </a:r>
           </a:p>
           <a:p>
             <a:pPr lvl="1"/>
             <a:r>
-              <a:rPr lang="ko-KR" altLang="en-US" smtClean="0"/>
+              <a:rPr lang="ko-KR" altLang="en-US"/>
               <a:t>둘째 수준</a:t>
             </a:r>
           </a:p>
           <a:p>
             <a:pPr lvl="2"/>
             <a:r>
-              <a:rPr lang="ko-KR" altLang="en-US" smtClean="0"/>
+              <a:rPr lang="ko-KR" altLang="en-US"/>
               <a:t>셋째 수준</a:t>
             </a:r>
           </a:p>
           <a:p>
             <a:pPr lvl="3"/>
             <a:r>
-              <a:rPr lang="ko-KR" altLang="en-US" smtClean="0"/>
+              <a:rPr lang="ko-KR" altLang="en-US"/>
               <a:t>넷째 수준</a:t>
             </a:r>
           </a:p>
           <a:p>
             <a:pPr lvl="4"/>
             <a:r>
-              <a:rPr lang="ko-KR" altLang="en-US" smtClean="0"/>
+              <a:rPr lang="ko-KR" altLang="en-US"/>
               <a:t>다섯째 수준</a:t>
             </a:r>
-            <a:endParaRPr lang="ko-KR" altLang="en-US"/>
           </a:p>
         </p:txBody>
       </p:sp>
@@ -3191,7 +3169,7 @@
           <a:p>
             <a:fld id="{388ED953-9DB3-4386-BC67-F5551596A4FF}" type="datetimeFigureOut">
               <a:rPr lang="ko-KR" altLang="en-US" smtClean="0"/>
-              <a:t>2020-01-22</a:t>
+              <a:t>2020-01-28</a:t>
             </a:fld>
             <a:endParaRPr lang="ko-KR" altLang="en-US"/>
           </a:p>
@@ -3604,18 +3582,13 @@
           <a:p>
             <a:pPr algn="ctr"/>
             <a:r>
-              <a:rPr lang="ko-KR" altLang="en-US" sz="1200" b="1" dirty="0" smtClean="0">
+              <a:rPr lang="ko-KR" altLang="en-US" sz="1200" b="1" dirty="0">
                 <a:solidFill>
                   <a:schemeClr val="bg1"/>
                 </a:solidFill>
               </a:rPr>
               <a:t>행정</a:t>
             </a:r>
-            <a:endParaRPr lang="ko-KR" altLang="en-US" sz="1200" b="1" dirty="0">
-              <a:solidFill>
-                <a:schemeClr val="bg1"/>
-              </a:solidFill>
-            </a:endParaRPr>
           </a:p>
         </p:txBody>
       </p:sp>
@@ -3657,18 +3630,13 @@
           <a:p>
             <a:pPr algn="ctr"/>
             <a:r>
-              <a:rPr lang="ko-KR" altLang="en-US" sz="1200" b="1" dirty="0" smtClean="0">
+              <a:rPr lang="ko-KR" altLang="en-US" sz="1200" b="1" dirty="0">
                 <a:solidFill>
                   <a:schemeClr val="bg1"/>
                 </a:solidFill>
               </a:rPr>
               <a:t>강사</a:t>
             </a:r>
-            <a:endParaRPr lang="ko-KR" altLang="en-US" sz="1200" b="1" dirty="0">
-              <a:solidFill>
-                <a:schemeClr val="bg1"/>
-              </a:solidFill>
-            </a:endParaRPr>
           </a:p>
         </p:txBody>
       </p:sp>
@@ -3710,7 +3678,7 @@
           <a:p>
             <a:pPr algn="ctr"/>
             <a:r>
-              <a:rPr lang="ko-KR" altLang="en-US" sz="1200" b="1" dirty="0" smtClean="0">
+              <a:rPr lang="ko-KR" altLang="en-US" sz="1200" b="1" dirty="0">
                 <a:solidFill>
                   <a:schemeClr val="bg1"/>
                 </a:solidFill>
@@ -3765,7 +3733,7 @@
           <a:p>
             <a:pPr algn="ctr"/>
             <a:r>
-              <a:rPr lang="ko-KR" altLang="en-US" sz="1200" dirty="0" smtClean="0"/>
+              <a:rPr lang="ko-KR" altLang="en-US" sz="1200" dirty="0"/>
               <a:t>회원관리</a:t>
             </a:r>
             <a:endParaRPr lang="en-US" altLang="ko-KR" sz="1200" dirty="0"/>
@@ -3812,7 +3780,7 @@
           <a:p>
             <a:pPr algn="ctr"/>
             <a:r>
-              <a:rPr lang="ko-KR" altLang="en-US" sz="1200" dirty="0" smtClean="0"/>
+              <a:rPr lang="ko-KR" altLang="en-US" sz="1200" dirty="0"/>
               <a:t>교육과정</a:t>
             </a:r>
             <a:r>
@@ -3820,7 +3788,7 @@
               <a:t> </a:t>
             </a:r>
             <a:r>
-              <a:rPr lang="ko-KR" altLang="en-US" sz="1200" dirty="0" smtClean="0"/>
+              <a:rPr lang="ko-KR" altLang="en-US" sz="1200" dirty="0"/>
               <a:t>관리</a:t>
             </a:r>
             <a:endParaRPr lang="en-US" altLang="ko-KR" sz="1200" dirty="0"/>
@@ -3867,10 +3835,9 @@
           <a:p>
             <a:pPr algn="ctr"/>
             <a:r>
-              <a:rPr lang="ko-KR" altLang="en-US" sz="1200" dirty="0" smtClean="0"/>
+              <a:rPr lang="ko-KR" altLang="en-US" sz="1200" dirty="0"/>
               <a:t>게시판 관리</a:t>
             </a:r>
-            <a:endParaRPr lang="ko-KR" altLang="en-US" sz="1200" dirty="0"/>
           </a:p>
         </p:txBody>
       </p:sp>
@@ -3914,7 +3881,7 @@
           <a:p>
             <a:pPr algn="ctr"/>
             <a:r>
-              <a:rPr lang="ko-KR" altLang="en-US" sz="1200" dirty="0" smtClean="0"/>
+              <a:rPr lang="ko-KR" altLang="en-US" sz="1200" dirty="0"/>
               <a:t>학원정보관리</a:t>
             </a:r>
             <a:endParaRPr lang="en-US" altLang="ko-KR" sz="1200" dirty="0"/>
@@ -4012,18 +3979,13 @@
           <a:p>
             <a:pPr algn="ctr"/>
             <a:r>
-              <a:rPr lang="ko-KR" altLang="en-US" sz="1200" b="1" dirty="0" smtClean="0">
+              <a:rPr lang="ko-KR" altLang="en-US" sz="1200" b="1" dirty="0">
                 <a:solidFill>
                   <a:schemeClr val="bg1"/>
                 </a:solidFill>
               </a:rPr>
               <a:t>학생지원</a:t>
             </a:r>
-            <a:endParaRPr lang="ko-KR" altLang="en-US" sz="1200" b="1" dirty="0">
-              <a:solidFill>
-                <a:schemeClr val="bg1"/>
-              </a:solidFill>
-            </a:endParaRPr>
           </a:p>
         </p:txBody>
       </p:sp>
@@ -4065,18 +4027,13 @@
           <a:p>
             <a:pPr algn="ctr"/>
             <a:r>
-              <a:rPr lang="ko-KR" altLang="en-US" sz="1200" b="1" dirty="0" smtClean="0">
+              <a:rPr lang="ko-KR" altLang="en-US" sz="1200" b="1" dirty="0">
                 <a:solidFill>
                   <a:schemeClr val="bg1"/>
                 </a:solidFill>
               </a:rPr>
               <a:t>취업지원</a:t>
             </a:r>
-            <a:endParaRPr lang="ko-KR" altLang="en-US" sz="1200" b="1" dirty="0">
-              <a:solidFill>
-                <a:schemeClr val="bg1"/>
-              </a:solidFill>
-            </a:endParaRPr>
           </a:p>
         </p:txBody>
       </p:sp>
@@ -4120,10 +4077,10 @@
           <a:p>
             <a:pPr algn="ctr"/>
             <a:r>
-              <a:rPr lang="ko-KR" altLang="en-US" sz="1200" dirty="0" smtClean="0"/>
+              <a:rPr lang="ko-KR" altLang="en-US" sz="1200" dirty="0"/>
               <a:t>교육센터 소개</a:t>
             </a:r>
-            <a:endParaRPr lang="en-US" altLang="ko-KR" sz="1200" dirty="0" smtClean="0"/>
+            <a:endParaRPr lang="en-US" altLang="ko-KR" sz="1200" dirty="0"/>
           </a:p>
         </p:txBody>
       </p:sp>
@@ -4150,7 +4107,7 @@
           <a:lstStyle/>
           <a:p>
             <a:r>
-              <a:rPr lang="en-US" altLang="ko-KR" sz="1600" dirty="0" smtClean="0">
+              <a:rPr lang="en-US" altLang="ko-KR" sz="1600" dirty="0">
                 <a:solidFill>
                   <a:schemeClr val="tx1">
                     <a:lumMod val="85000"/>
@@ -4161,7 +4118,7 @@
               <a:t>- </a:t>
             </a:r>
             <a:r>
-              <a:rPr lang="ko-KR" altLang="en-US" sz="1600" dirty="0" smtClean="0">
+              <a:rPr lang="ko-KR" altLang="en-US" sz="1600" dirty="0">
                 <a:solidFill>
                   <a:schemeClr val="tx1">
                     <a:lumMod val="85000"/>
@@ -4171,14 +4128,6 @@
               </a:rPr>
               <a:t>학원 홈페이지</a:t>
             </a:r>
-            <a:endParaRPr lang="ko-KR" altLang="en-US" sz="1600" dirty="0">
-              <a:solidFill>
-                <a:schemeClr val="tx1">
-                  <a:lumMod val="85000"/>
-                  <a:lumOff val="15000"/>
-                </a:schemeClr>
-              </a:solidFill>
-            </a:endParaRPr>
           </a:p>
         </p:txBody>
       </p:sp>
@@ -4222,10 +4171,9 @@
           <a:p>
             <a:pPr algn="ctr"/>
             <a:r>
-              <a:rPr lang="ko-KR" altLang="en-US" sz="1200" dirty="0" smtClean="0"/>
+              <a:rPr lang="ko-KR" altLang="en-US" sz="1200" dirty="0"/>
               <a:t>모집공고</a:t>
             </a:r>
-            <a:endParaRPr lang="ko-KR" altLang="en-US" sz="1200" dirty="0"/>
           </a:p>
         </p:txBody>
       </p:sp>
@@ -4267,18 +4215,13 @@
           <a:p>
             <a:pPr algn="ctr"/>
             <a:r>
-              <a:rPr lang="ko-KR" altLang="en-US" sz="1200" b="1" dirty="0" smtClean="0">
+              <a:rPr lang="ko-KR" altLang="en-US" sz="1200" b="1" dirty="0">
                 <a:solidFill>
                   <a:schemeClr val="bg1"/>
                 </a:solidFill>
               </a:rPr>
               <a:t>교육센터</a:t>
             </a:r>
-            <a:endParaRPr lang="ko-KR" altLang="en-US" sz="1200" b="1" dirty="0">
-              <a:solidFill>
-                <a:schemeClr val="bg1"/>
-              </a:solidFill>
-            </a:endParaRPr>
           </a:p>
         </p:txBody>
       </p:sp>
@@ -4322,10 +4265,9 @@
           <a:p>
             <a:pPr algn="ctr"/>
             <a:r>
-              <a:rPr lang="ko-KR" altLang="en-US" sz="1200" dirty="0" smtClean="0"/>
+              <a:rPr lang="ko-KR" altLang="en-US" sz="1200" dirty="0"/>
               <a:t>채용공고</a:t>
             </a:r>
-            <a:endParaRPr lang="ko-KR" altLang="en-US" sz="1200" dirty="0"/>
           </a:p>
         </p:txBody>
       </p:sp>
@@ -4369,10 +4311,9 @@
           <a:p>
             <a:pPr algn="ctr"/>
             <a:r>
-              <a:rPr lang="ko-KR" altLang="en-US" sz="1200" dirty="0" smtClean="0"/>
+              <a:rPr lang="ko-KR" altLang="en-US" sz="1200" dirty="0"/>
               <a:t>공지사항</a:t>
             </a:r>
-            <a:endParaRPr lang="ko-KR" altLang="en-US" sz="1200" dirty="0"/>
           </a:p>
         </p:txBody>
       </p:sp>
@@ -4419,7 +4360,6 @@
               <a:rPr lang="en-US" altLang="ko-KR" sz="1200" dirty="0"/>
               <a:t>FAQ</a:t>
             </a:r>
-            <a:endParaRPr lang="en-US" altLang="ko-KR" sz="1200" dirty="0" smtClean="0"/>
           </a:p>
         </p:txBody>
       </p:sp>
@@ -4446,7 +4386,7 @@
           <a:lstStyle/>
           <a:p>
             <a:r>
-              <a:rPr lang="en-US" altLang="ko-KR" sz="1600" dirty="0" smtClean="0">
+              <a:rPr lang="en-US" altLang="ko-KR" sz="1600" dirty="0">
                 <a:solidFill>
                   <a:schemeClr val="tx1">
                     <a:lumMod val="85000"/>
@@ -4457,7 +4397,7 @@
               <a:t>- LMS</a:t>
             </a:r>
             <a:r>
-              <a:rPr lang="ko-KR" altLang="en-US" sz="1600" dirty="0" smtClean="0">
+              <a:rPr lang="ko-KR" altLang="en-US" sz="1600" dirty="0">
                 <a:solidFill>
                   <a:schemeClr val="tx1">
                     <a:lumMod val="85000"/>
@@ -4467,14 +4407,6 @@
               </a:rPr>
               <a:t> 홈페이지</a:t>
             </a:r>
-            <a:endParaRPr lang="ko-KR" altLang="en-US" sz="1600" dirty="0">
-              <a:solidFill>
-                <a:schemeClr val="tx1">
-                  <a:lumMod val="85000"/>
-                  <a:lumOff val="15000"/>
-                </a:schemeClr>
-              </a:solidFill>
-            </a:endParaRPr>
           </a:p>
         </p:txBody>
       </p:sp>
@@ -4516,18 +4448,13 @@
           <a:p>
             <a:pPr algn="ctr"/>
             <a:r>
-              <a:rPr lang="ko-KR" altLang="en-US" sz="1200" b="1" dirty="0" smtClean="0">
+              <a:rPr lang="ko-KR" altLang="en-US" sz="1200" b="1" dirty="0">
                 <a:solidFill>
                   <a:schemeClr val="bg1"/>
                 </a:solidFill>
               </a:rPr>
               <a:t>학생</a:t>
             </a:r>
-            <a:endParaRPr lang="ko-KR" altLang="en-US" sz="1200" b="1" dirty="0">
-              <a:solidFill>
-                <a:schemeClr val="bg1"/>
-              </a:solidFill>
-            </a:endParaRPr>
           </a:p>
         </p:txBody>
       </p:sp>
@@ -4554,7 +4481,7 @@
           <a:lstStyle/>
           <a:p>
             <a:r>
-              <a:rPr lang="ko-KR" altLang="en-US" sz="2000" b="1" dirty="0" smtClean="0">
+              <a:rPr lang="ko-KR" altLang="en-US" sz="2000" b="1" dirty="0">
                 <a:solidFill>
                   <a:schemeClr val="tx1">
                     <a:lumMod val="85000"/>
@@ -4565,7 +4492,7 @@
               <a:t>메뉴설계 </a:t>
             </a:r>
             <a:r>
-              <a:rPr lang="en-US" altLang="ko-KR" sz="2000" b="1" dirty="0" smtClean="0">
+              <a:rPr lang="en-US" altLang="ko-KR" sz="2000" b="1" dirty="0">
                 <a:solidFill>
                   <a:schemeClr val="tx1">
                     <a:lumMod val="85000"/>
@@ -4695,7 +4622,7 @@
           <a:lstStyle/>
           <a:p>
             <a:r>
-              <a:rPr lang="en-US" altLang="ko-KR" sz="2000" b="1" dirty="0" smtClean="0">
+              <a:rPr lang="en-US" altLang="ko-KR" sz="2000" b="1" dirty="0">
                 <a:solidFill>
                   <a:schemeClr val="bg1"/>
                 </a:solidFill>
@@ -4745,10 +4672,9 @@
           <a:p>
             <a:pPr algn="ctr"/>
             <a:r>
-              <a:rPr lang="ko-KR" altLang="en-US" sz="1200" dirty="0" smtClean="0"/>
+              <a:rPr lang="ko-KR" altLang="en-US" sz="1200" dirty="0"/>
               <a:t>나의 출결현황</a:t>
             </a:r>
-            <a:endParaRPr lang="ko-KR" altLang="en-US" sz="1200" dirty="0"/>
           </a:p>
         </p:txBody>
       </p:sp>
@@ -4792,10 +4718,9 @@
           <a:p>
             <a:pPr algn="ctr"/>
             <a:r>
-              <a:rPr lang="ko-KR" altLang="en-US" sz="1200" dirty="0" smtClean="0"/>
+              <a:rPr lang="ko-KR" altLang="en-US" sz="1200" dirty="0"/>
               <a:t>나의 성적조회</a:t>
             </a:r>
-            <a:endParaRPr lang="ko-KR" altLang="en-US" sz="1200" dirty="0"/>
           </a:p>
         </p:txBody>
       </p:sp>
@@ -4839,10 +4764,10 @@
           <a:p>
             <a:pPr algn="ctr"/>
             <a:r>
-              <a:rPr lang="ko-KR" altLang="en-US" sz="1200" dirty="0" smtClean="0"/>
+              <a:rPr lang="ko-KR" altLang="en-US" sz="1200" dirty="0"/>
               <a:t>나의 교육과정</a:t>
             </a:r>
-            <a:endParaRPr lang="en-US" altLang="ko-KR" sz="1200" dirty="0" smtClean="0"/>
+            <a:endParaRPr lang="en-US" altLang="ko-KR" sz="1200" dirty="0"/>
           </a:p>
         </p:txBody>
       </p:sp>
@@ -4886,10 +4811,10 @@
           <a:p>
             <a:pPr algn="ctr"/>
             <a:r>
-              <a:rPr lang="ko-KR" altLang="en-US" sz="1200" dirty="0" smtClean="0"/>
+              <a:rPr lang="ko-KR" altLang="en-US" sz="1200" dirty="0"/>
               <a:t>성적 관리</a:t>
             </a:r>
-            <a:endParaRPr lang="en-US" altLang="ko-KR" sz="1200" dirty="0" smtClean="0"/>
+            <a:endParaRPr lang="en-US" altLang="ko-KR" sz="1200" dirty="0"/>
           </a:p>
         </p:txBody>
       </p:sp>
@@ -4933,7 +4858,7 @@
           <a:p>
             <a:pPr algn="ctr"/>
             <a:r>
-              <a:rPr lang="ko-KR" altLang="en-US" sz="1200" dirty="0" smtClean="0"/>
+              <a:rPr lang="ko-KR" altLang="en-US" sz="1200" dirty="0"/>
               <a:t>교육과정 정보</a:t>
             </a:r>
             <a:endParaRPr lang="en-US" altLang="ko-KR" sz="1200" dirty="0"/>
@@ -4980,10 +4905,10 @@
           <a:p>
             <a:pPr algn="ctr"/>
             <a:r>
-              <a:rPr lang="ko-KR" altLang="en-US" sz="1200" dirty="0" smtClean="0"/>
+              <a:rPr lang="ko-KR" altLang="en-US" sz="1200" dirty="0"/>
               <a:t>모집공고</a:t>
             </a:r>
-            <a:endParaRPr lang="en-US" altLang="ko-KR" sz="1200" dirty="0" smtClean="0"/>
+            <a:endParaRPr lang="en-US" altLang="ko-KR" sz="1200" dirty="0"/>
           </a:p>
         </p:txBody>
       </p:sp>
@@ -5027,7 +4952,7 @@
           <a:p>
             <a:pPr algn="ctr"/>
             <a:r>
-              <a:rPr lang="ko-KR" altLang="en-US" sz="1200" dirty="0" smtClean="0"/>
+              <a:rPr lang="ko-KR" altLang="en-US" sz="1200" dirty="0"/>
               <a:t>공지사항 관리</a:t>
             </a:r>
             <a:endParaRPr lang="en-US" altLang="ko-KR" sz="1200" dirty="0"/>
@@ -5200,7 +5125,7 @@
           <a:p>
             <a:pPr algn="ctr"/>
             <a:r>
-              <a:rPr lang="ko-KR" altLang="en-US" sz="1200" dirty="0" smtClean="0"/>
+              <a:rPr lang="ko-KR" altLang="en-US" sz="1200" dirty="0"/>
               <a:t>공지사항</a:t>
             </a:r>
             <a:endParaRPr lang="en-US" altLang="ko-KR" sz="1200" dirty="0"/>
@@ -5245,7 +5170,7 @@
           <a:p>
             <a:pPr algn="ctr"/>
             <a:r>
-              <a:rPr lang="ko-KR" altLang="en-US" sz="1200" b="1" dirty="0" smtClean="0">
+              <a:rPr lang="ko-KR" altLang="en-US" sz="1200" b="1" dirty="0">
                 <a:solidFill>
                   <a:schemeClr val="bg1"/>
                 </a:solidFill>
@@ -5253,7 +5178,7 @@
               <a:t>취업</a:t>
             </a:r>
             <a:r>
-              <a:rPr lang="en-US" altLang="ko-KR" sz="1200" b="1" dirty="0" smtClean="0">
+              <a:rPr lang="en-US" altLang="ko-KR" sz="1200" b="1" dirty="0">
                 <a:solidFill>
                   <a:schemeClr val="bg1"/>
                 </a:solidFill>
@@ -5261,7 +5186,7 @@
               <a:t>/</a:t>
             </a:r>
             <a:r>
-              <a:rPr lang="ko-KR" altLang="en-US" sz="1200" b="1" dirty="0" smtClean="0">
+              <a:rPr lang="ko-KR" altLang="en-US" sz="1200" b="1" dirty="0">
                 <a:solidFill>
                   <a:schemeClr val="bg1"/>
                 </a:solidFill>
@@ -5316,7 +5241,7 @@
           <a:p>
             <a:pPr algn="ctr"/>
             <a:r>
-              <a:rPr lang="ko-KR" altLang="en-US" sz="1200" dirty="0" smtClean="0"/>
+              <a:rPr lang="ko-KR" altLang="en-US" sz="1200" dirty="0"/>
               <a:t>모집공고 관리</a:t>
             </a:r>
             <a:endParaRPr lang="en-US" altLang="ko-KR" sz="1200" dirty="0"/>
@@ -5386,7 +5311,7 @@
           </a:xfrm>
           <a:prstGeom prst="bentConnector3">
             <a:avLst>
-              <a:gd name="adj1" fmla="val 50000"/>
+              <a:gd name="adj1" fmla="val 21841"/>
             </a:avLst>
           </a:prstGeom>
           <a:ln w="12700">
@@ -5720,18 +5645,13 @@
           <a:p>
             <a:pPr algn="ctr"/>
             <a:r>
-              <a:rPr lang="ko-KR" altLang="en-US" sz="1200" b="1" dirty="0" smtClean="0">
+              <a:rPr lang="ko-KR" altLang="en-US" sz="1200" b="1" dirty="0">
                 <a:solidFill>
                   <a:schemeClr val="bg1"/>
                 </a:solidFill>
               </a:rPr>
               <a:t>행정</a:t>
             </a:r>
-            <a:endParaRPr lang="ko-KR" altLang="en-US" sz="1200" b="1" dirty="0">
-              <a:solidFill>
-                <a:schemeClr val="bg1"/>
-              </a:solidFill>
-            </a:endParaRPr>
           </a:p>
         </p:txBody>
       </p:sp>
@@ -5773,18 +5693,13 @@
           <a:p>
             <a:pPr algn="ctr"/>
             <a:r>
-              <a:rPr lang="ko-KR" altLang="en-US" sz="1200" b="1" dirty="0" smtClean="0">
+              <a:rPr lang="ko-KR" altLang="en-US" sz="1200" b="1" dirty="0">
                 <a:solidFill>
                   <a:schemeClr val="bg1"/>
                 </a:solidFill>
               </a:rPr>
               <a:t>강사</a:t>
             </a:r>
-            <a:endParaRPr lang="ko-KR" altLang="en-US" sz="1200" b="1" dirty="0">
-              <a:solidFill>
-                <a:schemeClr val="bg1"/>
-              </a:solidFill>
-            </a:endParaRPr>
           </a:p>
         </p:txBody>
       </p:sp>
@@ -5826,7 +5741,7 @@
           <a:p>
             <a:pPr algn="ctr"/>
             <a:r>
-              <a:rPr lang="ko-KR" altLang="en-US" sz="1200" b="1" dirty="0" smtClean="0">
+              <a:rPr lang="ko-KR" altLang="en-US" sz="1200" b="1" dirty="0">
                 <a:solidFill>
                   <a:schemeClr val="bg1"/>
                 </a:solidFill>
@@ -5881,21 +5796,21 @@
           <a:p>
             <a:pPr algn="ctr"/>
             <a:r>
-              <a:rPr lang="ko-KR" altLang="en-US" sz="1200" dirty="0" smtClean="0"/>
+              <a:rPr lang="ko-KR" altLang="en-US" sz="1200" dirty="0"/>
               <a:t>모집공고</a:t>
             </a:r>
             <a:r>
-              <a:rPr lang="en-US" altLang="ko-KR" sz="1200" dirty="0" smtClean="0"/>
+              <a:rPr lang="en-US" altLang="ko-KR" sz="1200" dirty="0"/>
               <a:t>/</a:t>
             </a:r>
           </a:p>
           <a:p>
             <a:pPr algn="ctr"/>
             <a:r>
-              <a:rPr lang="ko-KR" altLang="en-US" sz="1200" dirty="0" smtClean="0"/>
+              <a:rPr lang="ko-KR" altLang="en-US" sz="1200" dirty="0"/>
               <a:t>수강등록 관리</a:t>
             </a:r>
-            <a:endParaRPr lang="en-US" altLang="ko-KR" sz="1200" dirty="0" smtClean="0"/>
+            <a:endParaRPr lang="en-US" altLang="ko-KR" sz="1200" dirty="0"/>
           </a:p>
         </p:txBody>
       </p:sp>
@@ -5939,7 +5854,7 @@
           <a:p>
             <a:pPr algn="ctr"/>
             <a:r>
-              <a:rPr lang="ko-KR" altLang="en-US" sz="1200" dirty="0" smtClean="0"/>
+              <a:rPr lang="ko-KR" altLang="en-US" sz="1200" dirty="0"/>
               <a:t>회원관리</a:t>
             </a:r>
             <a:endParaRPr lang="en-US" altLang="ko-KR" sz="1200" dirty="0"/>
@@ -5986,7 +5901,7 @@
           <a:p>
             <a:pPr algn="ctr"/>
             <a:r>
-              <a:rPr lang="ko-KR" altLang="en-US" sz="1200" dirty="0" smtClean="0"/>
+              <a:rPr lang="ko-KR" altLang="en-US" sz="1200" dirty="0"/>
               <a:t>교육과정</a:t>
             </a:r>
             <a:r>
@@ -5994,7 +5909,7 @@
               <a:t> </a:t>
             </a:r>
             <a:r>
-              <a:rPr lang="ko-KR" altLang="en-US" sz="1200" dirty="0" smtClean="0"/>
+              <a:rPr lang="ko-KR" altLang="en-US" sz="1200" dirty="0"/>
               <a:t>관리</a:t>
             </a:r>
             <a:endParaRPr lang="en-US" altLang="ko-KR" sz="1200" dirty="0"/>
@@ -6041,10 +5956,9 @@
           <a:p>
             <a:pPr algn="ctr"/>
             <a:r>
-              <a:rPr lang="ko-KR" altLang="en-US" sz="1200" dirty="0" smtClean="0"/>
+              <a:rPr lang="ko-KR" altLang="en-US" sz="1200" dirty="0"/>
               <a:t>게시판 관리</a:t>
             </a:r>
-            <a:endParaRPr lang="ko-KR" altLang="en-US" sz="1200" dirty="0"/>
           </a:p>
         </p:txBody>
       </p:sp>
@@ -6088,7 +6002,7 @@
           <a:p>
             <a:pPr algn="ctr"/>
             <a:r>
-              <a:rPr lang="ko-KR" altLang="en-US" sz="1200" dirty="0" smtClean="0"/>
+              <a:rPr lang="ko-KR" altLang="en-US" sz="1200" dirty="0"/>
               <a:t>학원정보관리</a:t>
             </a:r>
             <a:endParaRPr lang="en-US" altLang="ko-KR" sz="1200" dirty="0"/>
@@ -6186,18 +6100,13 @@
           <a:p>
             <a:pPr algn="ctr"/>
             <a:r>
-              <a:rPr lang="ko-KR" altLang="en-US" sz="1200" b="1" dirty="0" smtClean="0">
+              <a:rPr lang="ko-KR" altLang="en-US" sz="1200" b="1" dirty="0">
                 <a:solidFill>
                   <a:schemeClr val="bg1"/>
                 </a:solidFill>
               </a:rPr>
               <a:t>학생지원</a:t>
             </a:r>
-            <a:endParaRPr lang="ko-KR" altLang="en-US" sz="1200" b="1" dirty="0">
-              <a:solidFill>
-                <a:schemeClr val="bg1"/>
-              </a:solidFill>
-            </a:endParaRPr>
           </a:p>
         </p:txBody>
       </p:sp>
@@ -6239,18 +6148,13 @@
           <a:p>
             <a:pPr algn="ctr"/>
             <a:r>
-              <a:rPr lang="ko-KR" altLang="en-US" sz="1200" b="1" dirty="0" smtClean="0">
+              <a:rPr lang="ko-KR" altLang="en-US" sz="1200" b="1" dirty="0">
                 <a:solidFill>
                   <a:schemeClr val="bg1"/>
                 </a:solidFill>
               </a:rPr>
               <a:t>취업지원</a:t>
             </a:r>
-            <a:endParaRPr lang="ko-KR" altLang="en-US" sz="1200" b="1" dirty="0">
-              <a:solidFill>
-                <a:schemeClr val="bg1"/>
-              </a:solidFill>
-            </a:endParaRPr>
           </a:p>
         </p:txBody>
       </p:sp>
@@ -6294,10 +6198,10 @@
           <a:p>
             <a:pPr algn="ctr"/>
             <a:r>
-              <a:rPr lang="ko-KR" altLang="en-US" sz="1200" dirty="0" smtClean="0"/>
+              <a:rPr lang="ko-KR" altLang="en-US" sz="1200" dirty="0"/>
               <a:t>교육센터 소개</a:t>
             </a:r>
-            <a:endParaRPr lang="en-US" altLang="ko-KR" sz="1200" dirty="0" smtClean="0"/>
+            <a:endParaRPr lang="en-US" altLang="ko-KR" sz="1200" dirty="0"/>
           </a:p>
         </p:txBody>
       </p:sp>
@@ -6324,7 +6228,7 @@
           <a:lstStyle/>
           <a:p>
             <a:r>
-              <a:rPr lang="en-US" altLang="ko-KR" sz="1600" dirty="0" smtClean="0">
+              <a:rPr lang="en-US" altLang="ko-KR" sz="1600" dirty="0">
                 <a:solidFill>
                   <a:schemeClr val="tx1">
                     <a:lumMod val="85000"/>
@@ -6335,7 +6239,7 @@
               <a:t>- </a:t>
             </a:r>
             <a:r>
-              <a:rPr lang="ko-KR" altLang="en-US" sz="1600" dirty="0" smtClean="0">
+              <a:rPr lang="ko-KR" altLang="en-US" sz="1600" dirty="0">
                 <a:solidFill>
                   <a:schemeClr val="tx1">
                     <a:lumMod val="85000"/>
@@ -6345,14 +6249,6 @@
               </a:rPr>
               <a:t>학원 홈페이지</a:t>
             </a:r>
-            <a:endParaRPr lang="ko-KR" altLang="en-US" sz="1600" dirty="0">
-              <a:solidFill>
-                <a:schemeClr val="tx1">
-                  <a:lumMod val="85000"/>
-                  <a:lumOff val="15000"/>
-                </a:schemeClr>
-              </a:solidFill>
-            </a:endParaRPr>
           </a:p>
         </p:txBody>
       </p:sp>
@@ -6396,10 +6292,9 @@
           <a:p>
             <a:pPr algn="ctr"/>
             <a:r>
-              <a:rPr lang="ko-KR" altLang="en-US" sz="1200" dirty="0" smtClean="0"/>
+              <a:rPr lang="ko-KR" altLang="en-US" sz="1200" dirty="0"/>
               <a:t>모집공고</a:t>
             </a:r>
-            <a:endParaRPr lang="ko-KR" altLang="en-US" sz="1200" dirty="0"/>
           </a:p>
         </p:txBody>
       </p:sp>
@@ -6441,18 +6336,13 @@
           <a:p>
             <a:pPr algn="ctr"/>
             <a:r>
-              <a:rPr lang="ko-KR" altLang="en-US" sz="1200" b="1" dirty="0" smtClean="0">
+              <a:rPr lang="ko-KR" altLang="en-US" sz="1200" b="1" dirty="0">
                 <a:solidFill>
                   <a:schemeClr val="bg1"/>
                 </a:solidFill>
               </a:rPr>
               <a:t>교육센터</a:t>
             </a:r>
-            <a:endParaRPr lang="ko-KR" altLang="en-US" sz="1200" b="1" dirty="0">
-              <a:solidFill>
-                <a:schemeClr val="bg1"/>
-              </a:solidFill>
-            </a:endParaRPr>
           </a:p>
         </p:txBody>
       </p:sp>
@@ -6496,10 +6386,9 @@
           <a:p>
             <a:pPr algn="ctr"/>
             <a:r>
-              <a:rPr lang="ko-KR" altLang="en-US" sz="1200" dirty="0" smtClean="0"/>
+              <a:rPr lang="ko-KR" altLang="en-US" sz="1200" dirty="0"/>
               <a:t>채용공고</a:t>
             </a:r>
-            <a:endParaRPr lang="ko-KR" altLang="en-US" sz="1200" dirty="0"/>
           </a:p>
         </p:txBody>
       </p:sp>
@@ -6543,10 +6432,9 @@
           <a:p>
             <a:pPr algn="ctr"/>
             <a:r>
-              <a:rPr lang="ko-KR" altLang="en-US" sz="1200" dirty="0" smtClean="0"/>
+              <a:rPr lang="ko-KR" altLang="en-US" sz="1200" dirty="0"/>
               <a:t>공지사항</a:t>
             </a:r>
-            <a:endParaRPr lang="ko-KR" altLang="en-US" sz="1200" dirty="0"/>
           </a:p>
         </p:txBody>
       </p:sp>
@@ -6593,7 +6481,6 @@
               <a:rPr lang="en-US" altLang="ko-KR" sz="1200" dirty="0"/>
               <a:t>FAQ</a:t>
             </a:r>
-            <a:endParaRPr lang="en-US" altLang="ko-KR" sz="1200" dirty="0" smtClean="0"/>
           </a:p>
         </p:txBody>
       </p:sp>
@@ -6620,7 +6507,7 @@
           <a:lstStyle/>
           <a:p>
             <a:r>
-              <a:rPr lang="en-US" altLang="ko-KR" sz="1600" dirty="0" smtClean="0">
+              <a:rPr lang="en-US" altLang="ko-KR" sz="1600" dirty="0">
                 <a:solidFill>
                   <a:schemeClr val="tx1">
                     <a:lumMod val="85000"/>
@@ -6631,7 +6518,7 @@
               <a:t>- LMS</a:t>
             </a:r>
             <a:r>
-              <a:rPr lang="ko-KR" altLang="en-US" sz="1600" dirty="0" smtClean="0">
+              <a:rPr lang="ko-KR" altLang="en-US" sz="1600" dirty="0">
                 <a:solidFill>
                   <a:schemeClr val="tx1">
                     <a:lumMod val="85000"/>
@@ -6641,14 +6528,6 @@
               </a:rPr>
               <a:t> 홈페이지</a:t>
             </a:r>
-            <a:endParaRPr lang="ko-KR" altLang="en-US" sz="1600" dirty="0">
-              <a:solidFill>
-                <a:schemeClr val="tx1">
-                  <a:lumMod val="85000"/>
-                  <a:lumOff val="15000"/>
-                </a:schemeClr>
-              </a:solidFill>
-            </a:endParaRPr>
           </a:p>
         </p:txBody>
       </p:sp>
@@ -6690,18 +6569,13 @@
           <a:p>
             <a:pPr algn="ctr"/>
             <a:r>
-              <a:rPr lang="ko-KR" altLang="en-US" sz="1200" b="1" dirty="0" smtClean="0">
+              <a:rPr lang="ko-KR" altLang="en-US" sz="1200" b="1" dirty="0">
                 <a:solidFill>
                   <a:schemeClr val="bg1"/>
                 </a:solidFill>
               </a:rPr>
               <a:t>학생</a:t>
             </a:r>
-            <a:endParaRPr lang="ko-KR" altLang="en-US" sz="1200" b="1" dirty="0">
-              <a:solidFill>
-                <a:schemeClr val="bg1"/>
-              </a:solidFill>
-            </a:endParaRPr>
           </a:p>
         </p:txBody>
       </p:sp>
@@ -6728,7 +6602,7 @@
           <a:lstStyle/>
           <a:p>
             <a:r>
-              <a:rPr lang="ko-KR" altLang="en-US" sz="2000" b="1" dirty="0" smtClean="0">
+              <a:rPr lang="ko-KR" altLang="en-US" sz="2000" b="1" dirty="0">
                 <a:solidFill>
                   <a:schemeClr val="tx1">
                     <a:lumMod val="85000"/>
@@ -6739,7 +6613,7 @@
               <a:t>메뉴설계 </a:t>
             </a:r>
             <a:r>
-              <a:rPr lang="en-US" altLang="ko-KR" sz="2000" b="1" dirty="0" smtClean="0">
+              <a:rPr lang="en-US" altLang="ko-KR" sz="2000" b="1" dirty="0">
                 <a:solidFill>
                   <a:schemeClr val="tx1">
                     <a:lumMod val="85000"/>
@@ -6869,7 +6743,7 @@
           <a:lstStyle/>
           <a:p>
             <a:r>
-              <a:rPr lang="en-US" altLang="ko-KR" sz="2000" b="1" dirty="0" smtClean="0">
+              <a:rPr lang="en-US" altLang="ko-KR" sz="2000" b="1" dirty="0">
                 <a:solidFill>
                   <a:schemeClr val="bg1"/>
                 </a:solidFill>
@@ -6919,10 +6793,9 @@
           <a:p>
             <a:pPr algn="ctr"/>
             <a:r>
-              <a:rPr lang="ko-KR" altLang="en-US" sz="1200" dirty="0" smtClean="0"/>
+              <a:rPr lang="ko-KR" altLang="en-US" sz="1200" dirty="0"/>
               <a:t>나의 출결현황</a:t>
             </a:r>
-            <a:endParaRPr lang="ko-KR" altLang="en-US" sz="1200" dirty="0"/>
           </a:p>
         </p:txBody>
       </p:sp>
@@ -6966,10 +6839,9 @@
           <a:p>
             <a:pPr algn="ctr"/>
             <a:r>
-              <a:rPr lang="ko-KR" altLang="en-US" sz="1200" dirty="0" smtClean="0"/>
+              <a:rPr lang="ko-KR" altLang="en-US" sz="1200" dirty="0"/>
               <a:t>나의 성적조회</a:t>
             </a:r>
-            <a:endParaRPr lang="ko-KR" altLang="en-US" sz="1200" dirty="0"/>
           </a:p>
         </p:txBody>
       </p:sp>
@@ -7013,10 +6885,10 @@
           <a:p>
             <a:pPr algn="ctr"/>
             <a:r>
-              <a:rPr lang="ko-KR" altLang="en-US" sz="1200" dirty="0" smtClean="0"/>
+              <a:rPr lang="ko-KR" altLang="en-US" sz="1200" dirty="0"/>
               <a:t>나의 교육과정</a:t>
             </a:r>
-            <a:endParaRPr lang="en-US" altLang="ko-KR" sz="1200" dirty="0" smtClean="0"/>
+            <a:endParaRPr lang="en-US" altLang="ko-KR" sz="1200" dirty="0"/>
           </a:p>
         </p:txBody>
       </p:sp>
@@ -7060,10 +6932,10 @@
           <a:p>
             <a:pPr algn="ctr"/>
             <a:r>
-              <a:rPr lang="ko-KR" altLang="en-US" sz="1200" dirty="0" smtClean="0"/>
+              <a:rPr lang="ko-KR" altLang="en-US" sz="1200" dirty="0"/>
               <a:t>성적 관리</a:t>
             </a:r>
-            <a:endParaRPr lang="en-US" altLang="ko-KR" sz="1200" dirty="0" smtClean="0"/>
+            <a:endParaRPr lang="en-US" altLang="ko-KR" sz="1200" dirty="0"/>
           </a:p>
         </p:txBody>
       </p:sp>
@@ -7107,7 +6979,7 @@
           <a:p>
             <a:pPr algn="ctr"/>
             <a:r>
-              <a:rPr lang="ko-KR" altLang="en-US" sz="1200" dirty="0" smtClean="0"/>
+              <a:rPr lang="ko-KR" altLang="en-US" sz="1200" dirty="0"/>
               <a:t>교육과정 정보</a:t>
             </a:r>
             <a:endParaRPr lang="en-US" altLang="ko-KR" sz="1200" dirty="0"/>
@@ -7154,10 +7026,10 @@
           <a:p>
             <a:pPr algn="ctr"/>
             <a:r>
-              <a:rPr lang="ko-KR" altLang="en-US" sz="1200" dirty="0" smtClean="0"/>
+              <a:rPr lang="ko-KR" altLang="en-US" sz="1200" dirty="0"/>
               <a:t>모집공고</a:t>
             </a:r>
-            <a:endParaRPr lang="en-US" altLang="ko-KR" sz="1200" dirty="0" smtClean="0"/>
+            <a:endParaRPr lang="en-US" altLang="ko-KR" sz="1200" dirty="0"/>
           </a:p>
         </p:txBody>
       </p:sp>
@@ -7201,7 +7073,7 @@
           <a:p>
             <a:pPr algn="ctr"/>
             <a:r>
-              <a:rPr lang="ko-KR" altLang="en-US" sz="1200" dirty="0" smtClean="0"/>
+              <a:rPr lang="ko-KR" altLang="en-US" sz="1200" dirty="0"/>
               <a:t>공지사항 관리</a:t>
             </a:r>
             <a:endParaRPr lang="en-US" altLang="ko-KR" sz="1200" dirty="0"/>
@@ -7285,10 +7157,10 @@
               </a:lnSpc>
             </a:pPr>
             <a:r>
-              <a:rPr lang="ko-KR" altLang="en-US" sz="1000" dirty="0" smtClean="0"/>
+              <a:rPr lang="ko-KR" altLang="en-US" sz="1000" dirty="0"/>
               <a:t>★ 모집공고 ★</a:t>
             </a:r>
-            <a:endParaRPr lang="en-US" altLang="ko-KR" sz="1000" dirty="0" smtClean="0"/>
+            <a:endParaRPr lang="en-US" altLang="ko-KR" sz="1000" dirty="0"/>
           </a:p>
           <a:p>
             <a:pPr>
@@ -7297,18 +7169,18 @@
               </a:lnSpc>
             </a:pPr>
             <a:r>
-              <a:rPr lang="ko-KR" altLang="en-US" sz="1000" dirty="0" smtClean="0"/>
+              <a:rPr lang="ko-KR" altLang="en-US" sz="1000" dirty="0"/>
               <a:t>홈</a:t>
             </a:r>
             <a:r>
-              <a:rPr lang="en-US" altLang="ko-KR" sz="1000" dirty="0" smtClean="0"/>
+              <a:rPr lang="en-US" altLang="ko-KR" sz="1000" dirty="0"/>
               <a:t>/LMS </a:t>
             </a:r>
             <a:r>
-              <a:rPr lang="ko-KR" altLang="en-US" sz="1000" dirty="0" smtClean="0"/>
+              <a:rPr lang="ko-KR" altLang="en-US" sz="1000" dirty="0"/>
               <a:t>동일한 게시판</a:t>
             </a:r>
-            <a:endParaRPr lang="en-US" altLang="ko-KR" sz="1000" dirty="0" smtClean="0"/>
+            <a:endParaRPr lang="en-US" altLang="ko-KR" sz="1000" dirty="0"/>
           </a:p>
           <a:p>
             <a:pPr marL="171450" indent="-171450">
@@ -7319,23 +7191,23 @@
               <a:buChar char="•"/>
             </a:pPr>
             <a:r>
-              <a:rPr lang="ko-KR" altLang="en-US" sz="1000" dirty="0" smtClean="0"/>
+              <a:rPr lang="ko-KR" altLang="en-US" sz="1000" dirty="0"/>
               <a:t>홈</a:t>
             </a:r>
             <a:r>
-              <a:rPr lang="en-US" altLang="ko-KR" sz="1000" dirty="0" smtClean="0"/>
+              <a:rPr lang="en-US" altLang="ko-KR" sz="1000" dirty="0"/>
               <a:t> : [</a:t>
             </a:r>
             <a:r>
-              <a:rPr lang="ko-KR" altLang="en-US" sz="1000" dirty="0" smtClean="0"/>
+              <a:rPr lang="ko-KR" altLang="en-US" sz="1000" dirty="0"/>
               <a:t>수강신청 </a:t>
             </a:r>
             <a:r>
-              <a:rPr lang="ko-KR" altLang="en-US" sz="1000" dirty="0" err="1" smtClean="0"/>
+              <a:rPr lang="ko-KR" altLang="en-US" sz="1000" dirty="0" err="1"/>
               <a:t>바로가기</a:t>
             </a:r>
             <a:r>
-              <a:rPr lang="en-US" altLang="ko-KR" sz="1000" dirty="0" smtClean="0"/>
+              <a:rPr lang="en-US" altLang="ko-KR" sz="1000" dirty="0"/>
               <a:t>] </a:t>
             </a:r>
           </a:p>
@@ -7347,17 +7219,13 @@
             </a:pPr>
             <a:r>
               <a:rPr lang="en-US" altLang="ko-KR" sz="1000" dirty="0"/>
-              <a:t> </a:t>
-            </a:r>
-            <a:r>
-              <a:rPr lang="en-US" altLang="ko-KR" sz="1000" dirty="0" smtClean="0"/>
-              <a:t>  LMS-</a:t>
-            </a:r>
-            <a:r>
-              <a:rPr lang="ko-KR" altLang="en-US" sz="1000" dirty="0" smtClean="0"/>
+              <a:t>   LMS-</a:t>
+            </a:r>
+            <a:r>
+              <a:rPr lang="ko-KR" altLang="en-US" sz="1000" dirty="0"/>
               <a:t>모집공고로 이동</a:t>
             </a:r>
-            <a:endParaRPr lang="en-US" altLang="ko-KR" sz="1000" dirty="0" smtClean="0"/>
+            <a:endParaRPr lang="en-US" altLang="ko-KR" sz="1000" dirty="0"/>
           </a:p>
           <a:p>
             <a:pPr marL="171450" indent="-171450">
@@ -7368,30 +7236,30 @@
               <a:buChar char="•"/>
             </a:pPr>
             <a:r>
-              <a:rPr lang="en-US" altLang="ko-KR" sz="1000" dirty="0" smtClean="0"/>
+              <a:rPr lang="en-US" altLang="ko-KR" sz="1000" dirty="0"/>
               <a:t>LMS</a:t>
             </a:r>
             <a:r>
-              <a:rPr lang="ko-KR" altLang="en-US" sz="1000" dirty="0" smtClean="0"/>
+              <a:rPr lang="ko-KR" altLang="en-US" sz="1000" dirty="0"/>
               <a:t> </a:t>
             </a:r>
             <a:r>
-              <a:rPr lang="en-US" altLang="ko-KR" sz="1000" dirty="0" smtClean="0"/>
+              <a:rPr lang="en-US" altLang="ko-KR" sz="1000" dirty="0"/>
               <a:t>: [</a:t>
             </a:r>
             <a:r>
-              <a:rPr lang="ko-KR" altLang="en-US" sz="1000" dirty="0" smtClean="0"/>
+              <a:rPr lang="ko-KR" altLang="en-US" sz="1000" dirty="0"/>
               <a:t>수강신청</a:t>
             </a:r>
             <a:r>
-              <a:rPr lang="en-US" altLang="ko-KR" sz="1000" dirty="0" smtClean="0"/>
+              <a:rPr lang="en-US" altLang="ko-KR" sz="1000" dirty="0"/>
               <a:t>]</a:t>
             </a:r>
             <a:r>
-              <a:rPr lang="ko-KR" altLang="en-US" sz="1000" dirty="0" smtClean="0"/>
+              <a:rPr lang="ko-KR" altLang="en-US" sz="1000" dirty="0"/>
               <a:t> 기능</a:t>
             </a:r>
-            <a:endParaRPr lang="en-US" altLang="ko-KR" sz="1000" dirty="0" smtClean="0"/>
+            <a:endParaRPr lang="en-US" altLang="ko-KR" sz="1000" dirty="0"/>
           </a:p>
         </p:txBody>
       </p:sp>
@@ -7515,21 +7383,9 @@
             </a:pPr>
             <a:r>
               <a:rPr lang="ko-KR" altLang="en-US" sz="1000" dirty="0"/>
-              <a:t>★ </a:t>
-            </a:r>
-            <a:r>
-              <a:rPr lang="ko-KR" altLang="en-US" sz="1000" dirty="0" smtClean="0"/>
-              <a:t>교육과정</a:t>
-            </a:r>
-            <a:r>
-              <a:rPr lang="ko-KR" altLang="en-US" sz="1000" dirty="0"/>
-              <a:t> </a:t>
-            </a:r>
-            <a:r>
-              <a:rPr lang="ko-KR" altLang="en-US" sz="1000" dirty="0" smtClean="0"/>
-              <a:t>★</a:t>
-            </a:r>
-            <a:endParaRPr lang="en-US" altLang="ko-KR" sz="1000" dirty="0" smtClean="0"/>
+              <a:t>★ 교육과정 ★</a:t>
+            </a:r>
+            <a:endParaRPr lang="en-US" altLang="ko-KR" sz="1000" dirty="0"/>
           </a:p>
           <a:p>
             <a:pPr>
@@ -7538,7 +7394,7 @@
               </a:lnSpc>
             </a:pPr>
             <a:r>
-              <a:rPr lang="en-US" altLang="ko-KR" sz="1000" dirty="0" smtClean="0"/>
+              <a:rPr lang="en-US" altLang="ko-KR" sz="1000" dirty="0"/>
               <a:t>(</a:t>
             </a:r>
             <a:r>
@@ -7551,13 +7407,9 @@
             </a:r>
             <a:r>
               <a:rPr lang="ko-KR" altLang="en-US" sz="1000" dirty="0"/>
-              <a:t>교육과정 </a:t>
-            </a:r>
-            <a:r>
-              <a:rPr lang="ko-KR" altLang="en-US" sz="1000" dirty="0" smtClean="0"/>
-              <a:t>관리</a:t>
-            </a:r>
-            <a:endParaRPr lang="en-US" altLang="ko-KR" sz="1000" dirty="0" smtClean="0"/>
+              <a:t>교육과정 관리</a:t>
+            </a:r>
+            <a:endParaRPr lang="en-US" altLang="ko-KR" sz="1000" dirty="0"/>
           </a:p>
           <a:p>
             <a:pPr>
@@ -7566,14 +7418,14 @@
               </a:lnSpc>
             </a:pPr>
             <a:r>
-              <a:rPr lang="en-US" altLang="ko-KR" sz="1000" dirty="0" smtClean="0"/>
+              <a:rPr lang="en-US" altLang="ko-KR" sz="1000" dirty="0"/>
               <a:t>&gt; </a:t>
             </a:r>
             <a:r>
-              <a:rPr lang="ko-KR" altLang="en-US" sz="1000" dirty="0" smtClean="0"/>
+              <a:rPr lang="ko-KR" altLang="en-US" sz="1000" dirty="0"/>
               <a:t>교육과정 개설</a:t>
             </a:r>
-            <a:endParaRPr lang="en-US" altLang="ko-KR" sz="1000" dirty="0" smtClean="0"/>
+            <a:endParaRPr lang="en-US" altLang="ko-KR" sz="1000" dirty="0"/>
           </a:p>
           <a:p>
             <a:pPr>
@@ -7582,52 +7434,12 @@
               </a:lnSpc>
             </a:pPr>
             <a:r>
-              <a:rPr lang="en-US" altLang="ko-KR" sz="1000" dirty="0" smtClean="0"/>
+              <a:rPr lang="en-US" altLang="ko-KR" sz="1000" dirty="0"/>
               <a:t>&gt; </a:t>
             </a:r>
             <a:r>
-              <a:rPr lang="ko-KR" altLang="en-US" sz="1000" dirty="0" smtClean="0"/>
+              <a:rPr lang="ko-KR" altLang="en-US" sz="1000" dirty="0"/>
               <a:t>교육과정에 강사 배정</a:t>
-            </a:r>
-            <a:r>
-              <a:rPr lang="en-US" altLang="ko-KR" sz="1000" dirty="0" smtClean="0"/>
-              <a:t>/</a:t>
-            </a:r>
-            <a:r>
-              <a:rPr lang="ko-KR" altLang="en-US" sz="1000" dirty="0" smtClean="0"/>
-              <a:t>삭제</a:t>
-            </a:r>
-            <a:endParaRPr lang="en-US" altLang="ko-KR" sz="1000" dirty="0" smtClean="0"/>
-          </a:p>
-          <a:p>
-            <a:pPr>
-              <a:lnSpc>
-                <a:spcPct val="150000"/>
-              </a:lnSpc>
-            </a:pPr>
-            <a:endParaRPr lang="en-US" altLang="ko-KR" sz="1000" dirty="0" smtClean="0"/>
-          </a:p>
-          <a:p>
-            <a:pPr>
-              <a:lnSpc>
-                <a:spcPct val="150000"/>
-              </a:lnSpc>
-            </a:pPr>
-            <a:r>
-              <a:rPr lang="en-US" altLang="ko-KR" sz="1000" dirty="0"/>
-              <a:t>(</a:t>
-            </a:r>
-            <a:r>
-              <a:rPr lang="ko-KR" altLang="en-US" sz="1000" dirty="0"/>
-              <a:t>영업</a:t>
-            </a:r>
-            <a:r>
-              <a:rPr lang="en-US" altLang="ko-KR" sz="1000" dirty="0"/>
-              <a:t>) </a:t>
-            </a:r>
-            <a:r>
-              <a:rPr lang="ko-KR" altLang="en-US" sz="1000" dirty="0"/>
-              <a:t>모집공고</a:t>
             </a:r>
             <a:r>
               <a:rPr lang="en-US" altLang="ko-KR" sz="1000" dirty="0"/>
@@ -7635,113 +7447,9 @@
             </a:r>
             <a:r>
               <a:rPr lang="ko-KR" altLang="en-US" sz="1000" dirty="0"/>
-              <a:t>수강등록 </a:t>
-            </a:r>
-            <a:r>
-              <a:rPr lang="ko-KR" altLang="en-US" sz="1000" dirty="0" smtClean="0"/>
-              <a:t>관리</a:t>
-            </a:r>
-            <a:endParaRPr lang="en-US" altLang="ko-KR" sz="1000" dirty="0" smtClean="0"/>
-          </a:p>
-          <a:p>
-            <a:pPr>
-              <a:lnSpc>
-                <a:spcPct val="150000"/>
-              </a:lnSpc>
-            </a:pPr>
-            <a:r>
-              <a:rPr lang="en-US" altLang="ko-KR" sz="1000" dirty="0" smtClean="0"/>
-              <a:t>&gt; </a:t>
-            </a:r>
-            <a:r>
-              <a:rPr lang="ko-KR" altLang="en-US" sz="1000" dirty="0" smtClean="0"/>
-              <a:t>개설된 교육과정을 모집공고 </a:t>
-            </a:r>
-            <a:r>
-              <a:rPr lang="ko-KR" altLang="en-US" sz="1000" dirty="0"/>
-              <a:t>게시판에</a:t>
-            </a:r>
-            <a:endParaRPr lang="en-US" altLang="ko-KR" sz="1000" dirty="0" smtClean="0"/>
-          </a:p>
-          <a:p>
-            <a:pPr>
-              <a:lnSpc>
-                <a:spcPct val="150000"/>
-              </a:lnSpc>
-            </a:pPr>
-            <a:r>
-              <a:rPr lang="ko-KR" altLang="en-US" sz="1000" dirty="0" smtClean="0"/>
-              <a:t>업로드</a:t>
-            </a:r>
-            <a:r>
-              <a:rPr lang="en-US" altLang="ko-KR" sz="1000" dirty="0" smtClean="0"/>
-              <a:t>(</a:t>
-            </a:r>
-            <a:r>
-              <a:rPr lang="ko-KR" altLang="en-US" sz="1000" dirty="0" smtClean="0"/>
-              <a:t>복사</a:t>
-            </a:r>
-            <a:r>
-              <a:rPr lang="en-US" altLang="ko-KR" sz="1000" dirty="0" smtClean="0"/>
-              <a:t>)</a:t>
-            </a:r>
-            <a:r>
-              <a:rPr lang="ko-KR" altLang="en-US" sz="1000" dirty="0" smtClean="0"/>
-              <a:t> 또는 삭제</a:t>
-            </a:r>
-            <a:r>
-              <a:rPr lang="en-US" altLang="ko-KR" sz="1000" dirty="0" smtClean="0"/>
-              <a:t>.</a:t>
-            </a:r>
-            <a:r>
-              <a:rPr lang="ko-KR" altLang="en-US" sz="1000" dirty="0" smtClean="0"/>
-              <a:t> 수정 불가</a:t>
-            </a:r>
-            <a:endParaRPr lang="en-US" altLang="ko-KR" sz="1000" dirty="0" smtClean="0"/>
-          </a:p>
-          <a:p>
-            <a:pPr>
-              <a:lnSpc>
-                <a:spcPct val="150000"/>
-              </a:lnSpc>
-            </a:pPr>
-            <a:r>
-              <a:rPr lang="en-US" altLang="ko-KR" sz="1000" dirty="0" smtClean="0"/>
-              <a:t>&gt; </a:t>
-            </a:r>
-            <a:r>
-              <a:rPr lang="ko-KR" altLang="en-US" sz="1000" dirty="0" smtClean="0"/>
-              <a:t>모집공고에 </a:t>
-            </a:r>
-            <a:r>
-              <a:rPr lang="ko-KR" altLang="en-US" sz="1000" dirty="0" err="1" smtClean="0"/>
-              <a:t>수강신청한</a:t>
-            </a:r>
-            <a:r>
-              <a:rPr lang="ko-KR" altLang="en-US" sz="1000" dirty="0" smtClean="0"/>
-              <a:t> 학생을</a:t>
-            </a:r>
-            <a:endParaRPr lang="en-US" altLang="ko-KR" sz="1000" dirty="0" smtClean="0"/>
-          </a:p>
-          <a:p>
-            <a:pPr>
-              <a:lnSpc>
-                <a:spcPct val="150000"/>
-              </a:lnSpc>
-            </a:pPr>
-            <a:r>
-              <a:rPr lang="ko-KR" altLang="en-US" sz="1000" dirty="0" smtClean="0"/>
-              <a:t>해당 교육과정에 배정</a:t>
-            </a:r>
-            <a:r>
-              <a:rPr lang="en-US" altLang="ko-KR" sz="1000" dirty="0" smtClean="0"/>
-              <a:t>/</a:t>
-            </a:r>
-            <a:r>
-              <a:rPr lang="ko-KR" altLang="en-US" sz="1000" dirty="0" smtClean="0"/>
               <a:t>삭제</a:t>
             </a:r>
-            <a:endParaRPr lang="en-US" altLang="ko-KR" sz="1000" dirty="0" smtClean="0"/>
+            <a:endParaRPr lang="en-US" altLang="ko-KR" sz="1000" dirty="0"/>
           </a:p>
           <a:p>
             <a:pPr>
@@ -7758,42 +7466,30 @@
               </a:lnSpc>
             </a:pPr>
             <a:r>
-              <a:rPr lang="en-US" altLang="ko-KR" sz="1000" dirty="0" smtClean="0"/>
+              <a:rPr lang="en-US" altLang="ko-KR" sz="1000" dirty="0"/>
               <a:t>(</a:t>
             </a:r>
             <a:r>
-              <a:rPr lang="ko-KR" altLang="en-US" sz="1000" dirty="0" smtClean="0"/>
-              <a:t>학생</a:t>
-            </a:r>
-            <a:r>
-              <a:rPr lang="en-US" altLang="ko-KR" sz="1000" dirty="0" smtClean="0"/>
+              <a:rPr lang="ko-KR" altLang="en-US" sz="1000" dirty="0"/>
+              <a:t>영업</a:t>
+            </a:r>
+            <a:r>
+              <a:rPr lang="en-US" altLang="ko-KR" sz="1000" dirty="0"/>
               <a:t>) </a:t>
             </a:r>
             <a:r>
-              <a:rPr lang="ko-KR" altLang="en-US" sz="1000" dirty="0" smtClean="0"/>
-              <a:t>나의 교육과정</a:t>
+              <a:rPr lang="ko-KR" altLang="en-US" sz="1000" dirty="0"/>
+              <a:t>모집공고</a:t>
             </a:r>
             <a:r>
               <a:rPr lang="en-US" altLang="ko-KR" sz="1000" dirty="0"/>
-              <a:t> </a:t>
-            </a:r>
-            <a:r>
-              <a:rPr lang="en-US" altLang="ko-KR" sz="1000" dirty="0" smtClean="0"/>
-              <a:t>/ (</a:t>
-            </a:r>
-            <a:r>
-              <a:rPr lang="ko-KR" altLang="en-US" sz="1000" dirty="0" smtClean="0"/>
-              <a:t>강사</a:t>
-            </a:r>
-            <a:r>
-              <a:rPr lang="en-US" altLang="ko-KR" sz="1000" dirty="0" smtClean="0"/>
-              <a:t>) </a:t>
-            </a:r>
-            <a:r>
-              <a:rPr lang="ko-KR" altLang="en-US" sz="1000" dirty="0" smtClean="0"/>
-              <a:t>교육과정 정보</a:t>
-            </a:r>
-            <a:endParaRPr lang="en-US" altLang="ko-KR" sz="1000" dirty="0" smtClean="0"/>
+              <a:t>/</a:t>
+            </a:r>
+            <a:r>
+              <a:rPr lang="ko-KR" altLang="en-US" sz="1000" dirty="0"/>
+              <a:t>수강등록 관리</a:t>
+            </a:r>
+            <a:endParaRPr lang="en-US" altLang="ko-KR" sz="1000" dirty="0"/>
           </a:p>
           <a:p>
             <a:pPr>
@@ -7802,14 +7498,158 @@
               </a:lnSpc>
             </a:pPr>
             <a:r>
-              <a:rPr lang="en-US" altLang="ko-KR" sz="1000" dirty="0" smtClean="0"/>
+              <a:rPr lang="en-US" altLang="ko-KR" sz="1000" dirty="0"/>
               <a:t>&gt; </a:t>
             </a:r>
             <a:r>
-              <a:rPr lang="ko-KR" altLang="en-US" sz="1000" dirty="0" smtClean="0"/>
+              <a:rPr lang="ko-KR" altLang="en-US" sz="1000" dirty="0"/>
+              <a:t>개설된 교육과정을 모집공고 게시판에</a:t>
+            </a:r>
+            <a:endParaRPr lang="en-US" altLang="ko-KR" sz="1000" dirty="0"/>
+          </a:p>
+          <a:p>
+            <a:pPr>
+              <a:lnSpc>
+                <a:spcPct val="150000"/>
+              </a:lnSpc>
+            </a:pPr>
+            <a:r>
+              <a:rPr lang="ko-KR" altLang="en-US" sz="1000" dirty="0"/>
+              <a:t>업로드</a:t>
+            </a:r>
+            <a:r>
+              <a:rPr lang="en-US" altLang="ko-KR" sz="1000" dirty="0"/>
+              <a:t>(</a:t>
+            </a:r>
+            <a:r>
+              <a:rPr lang="ko-KR" altLang="en-US" sz="1000" dirty="0"/>
+              <a:t>복사</a:t>
+            </a:r>
+            <a:r>
+              <a:rPr lang="en-US" altLang="ko-KR" sz="1000" dirty="0"/>
+              <a:t>)</a:t>
+            </a:r>
+            <a:r>
+              <a:rPr lang="ko-KR" altLang="en-US" sz="1000" dirty="0"/>
+              <a:t> 또는 삭제</a:t>
+            </a:r>
+            <a:r>
+              <a:rPr lang="en-US" altLang="ko-KR" sz="1000" dirty="0"/>
+              <a:t>.</a:t>
+            </a:r>
+            <a:r>
+              <a:rPr lang="ko-KR" altLang="en-US" sz="1000" dirty="0"/>
+              <a:t> 수정 불가</a:t>
+            </a:r>
+            <a:endParaRPr lang="en-US" altLang="ko-KR" sz="1000" dirty="0"/>
+          </a:p>
+          <a:p>
+            <a:pPr>
+              <a:lnSpc>
+                <a:spcPct val="150000"/>
+              </a:lnSpc>
+            </a:pPr>
+            <a:r>
+              <a:rPr lang="en-US" altLang="ko-KR" sz="1000" dirty="0"/>
+              <a:t>&gt; </a:t>
+            </a:r>
+            <a:r>
+              <a:rPr lang="ko-KR" altLang="en-US" sz="1000" dirty="0"/>
+              <a:t>모집공고에 </a:t>
+            </a:r>
+            <a:r>
+              <a:rPr lang="ko-KR" altLang="en-US" sz="1000" dirty="0" err="1"/>
+              <a:t>수강신청한</a:t>
+            </a:r>
+            <a:r>
+              <a:rPr lang="ko-KR" altLang="en-US" sz="1000" dirty="0"/>
+              <a:t> 학생을</a:t>
+            </a:r>
+            <a:endParaRPr lang="en-US" altLang="ko-KR" sz="1000" dirty="0"/>
+          </a:p>
+          <a:p>
+            <a:pPr>
+              <a:lnSpc>
+                <a:spcPct val="150000"/>
+              </a:lnSpc>
+            </a:pPr>
+            <a:r>
+              <a:rPr lang="ko-KR" altLang="en-US" sz="1000" dirty="0"/>
+              <a:t>해당 교육과정에 배정</a:t>
+            </a:r>
+            <a:r>
+              <a:rPr lang="en-US" altLang="ko-KR" sz="1000" dirty="0"/>
+              <a:t>/</a:t>
+            </a:r>
+            <a:r>
+              <a:rPr lang="ko-KR" altLang="en-US" sz="1000" dirty="0"/>
+              <a:t>삭제</a:t>
+            </a:r>
+            <a:endParaRPr lang="en-US" altLang="ko-KR" sz="1000" dirty="0"/>
+          </a:p>
+          <a:p>
+            <a:pPr>
+              <a:lnSpc>
+                <a:spcPct val="150000"/>
+              </a:lnSpc>
+            </a:pPr>
+            <a:endParaRPr lang="en-US" altLang="ko-KR" sz="1000" dirty="0"/>
+          </a:p>
+          <a:p>
+            <a:pPr>
+              <a:lnSpc>
+                <a:spcPct val="150000"/>
+              </a:lnSpc>
+            </a:pPr>
+            <a:r>
+              <a:rPr lang="en-US" altLang="ko-KR" sz="1000" dirty="0"/>
+              <a:t>(</a:t>
+            </a:r>
+            <a:r>
+              <a:rPr lang="ko-KR" altLang="en-US" sz="1000" dirty="0"/>
+              <a:t>학생</a:t>
+            </a:r>
+            <a:r>
+              <a:rPr lang="en-US" altLang="ko-KR" sz="1000" dirty="0"/>
+              <a:t>) </a:t>
+            </a:r>
+            <a:r>
+              <a:rPr lang="ko-KR" altLang="en-US" sz="1000" dirty="0"/>
+              <a:t>나의 교육과정</a:t>
+            </a:r>
+            <a:r>
+              <a:rPr lang="en-US" altLang="ko-KR" sz="1000" dirty="0"/>
+              <a:t> / (</a:t>
+            </a:r>
+            <a:r>
+              <a:rPr lang="ko-KR" altLang="en-US" sz="1000" dirty="0"/>
+              <a:t>강사</a:t>
+            </a:r>
+            <a:r>
+              <a:rPr lang="en-US" altLang="ko-KR" sz="1000" dirty="0"/>
+              <a:t>) </a:t>
+            </a:r>
+            <a:r>
+              <a:rPr lang="ko-KR" altLang="en-US" sz="1000" dirty="0"/>
+              <a:t>교육과정 정보</a:t>
+            </a:r>
+            <a:endParaRPr lang="en-US" altLang="ko-KR" sz="1000" dirty="0"/>
+          </a:p>
+          <a:p>
+            <a:pPr>
+              <a:lnSpc>
+                <a:spcPct val="150000"/>
+              </a:lnSpc>
+            </a:pPr>
+            <a:r>
+              <a:rPr lang="en-US" altLang="ko-KR" sz="1000" dirty="0"/>
+              <a:t>&gt; </a:t>
+            </a:r>
+            <a:r>
+              <a:rPr lang="ko-KR" altLang="en-US" sz="1000" dirty="0"/>
               <a:t>자신이 배정된 교육과정 정보 조회</a:t>
             </a:r>
-            <a:endParaRPr lang="en-US" altLang="ko-KR" sz="1000" dirty="0" smtClean="0"/>
+            <a:endParaRPr lang="en-US" altLang="ko-KR" sz="1000" dirty="0"/>
           </a:p>
         </p:txBody>
       </p:sp>
@@ -7853,7 +7693,7 @@
           <a:p>
             <a:pPr algn="ctr"/>
             <a:r>
-              <a:rPr lang="ko-KR" altLang="en-US" sz="1200" dirty="0" smtClean="0"/>
+              <a:rPr lang="ko-KR" altLang="en-US" sz="1200" dirty="0"/>
               <a:t>공지사항</a:t>
             </a:r>
             <a:endParaRPr lang="en-US" altLang="ko-KR" sz="1200" dirty="0"/>
@@ -7895,34 +7735,34 @@
               </a:lnSpc>
             </a:pPr>
             <a:r>
-              <a:rPr lang="ko-KR" altLang="en-US" sz="1000" dirty="0" smtClean="0"/>
+              <a:rPr lang="ko-KR" altLang="en-US" sz="1000" dirty="0"/>
               <a:t>★ </a:t>
             </a:r>
             <a:r>
-              <a:rPr lang="en-US" altLang="ko-KR" sz="1000" dirty="0" smtClean="0"/>
+              <a:rPr lang="en-US" altLang="ko-KR" sz="1000" dirty="0"/>
               <a:t>(</a:t>
             </a:r>
             <a:r>
-              <a:rPr lang="ko-KR" altLang="en-US" sz="1000" dirty="0" smtClean="0"/>
+              <a:rPr lang="ko-KR" altLang="en-US" sz="1000" dirty="0"/>
               <a:t>강사</a:t>
             </a:r>
             <a:r>
-              <a:rPr lang="en-US" altLang="ko-KR" sz="1000" dirty="0" smtClean="0"/>
+              <a:rPr lang="en-US" altLang="ko-KR" sz="1000" dirty="0"/>
               <a:t>/</a:t>
             </a:r>
             <a:r>
-              <a:rPr lang="ko-KR" altLang="en-US" sz="1000" dirty="0" smtClean="0"/>
+              <a:rPr lang="ko-KR" altLang="en-US" sz="1000" dirty="0"/>
               <a:t>학생</a:t>
             </a:r>
             <a:r>
-              <a:rPr lang="en-US" altLang="ko-KR" sz="1000" dirty="0" smtClean="0"/>
+              <a:rPr lang="en-US" altLang="ko-KR" sz="1000" dirty="0"/>
               <a:t>) </a:t>
             </a:r>
             <a:r>
-              <a:rPr lang="ko-KR" altLang="en-US" sz="1000" dirty="0" smtClean="0"/>
+              <a:rPr lang="ko-KR" altLang="en-US" sz="1000" dirty="0"/>
               <a:t>공지사항 ★</a:t>
             </a:r>
-            <a:endParaRPr lang="en-US" altLang="ko-KR" sz="1000" dirty="0" smtClean="0"/>
+            <a:endParaRPr lang="en-US" altLang="ko-KR" sz="1000" dirty="0"/>
           </a:p>
           <a:p>
             <a:pPr>
@@ -7931,14 +7771,14 @@
               </a:lnSpc>
             </a:pPr>
             <a:r>
-              <a:rPr lang="en-US" altLang="ko-KR" sz="1000" dirty="0" smtClean="0"/>
+              <a:rPr lang="en-US" altLang="ko-KR" sz="1000" dirty="0"/>
               <a:t>&gt; </a:t>
             </a:r>
             <a:r>
-              <a:rPr lang="ko-KR" altLang="en-US" sz="1000" dirty="0" smtClean="0"/>
+              <a:rPr lang="ko-KR" altLang="en-US" sz="1000" dirty="0"/>
               <a:t>자신이 배정된 교육과정의 공지사항 게시판</a:t>
             </a:r>
-            <a:endParaRPr lang="en-US" altLang="ko-KR" sz="1000" dirty="0" smtClean="0"/>
+            <a:endParaRPr lang="en-US" altLang="ko-KR" sz="1000" dirty="0"/>
           </a:p>
         </p:txBody>
       </p:sp>
@@ -8063,18 +7903,13 @@
           <a:p>
             <a:pPr algn="ctr"/>
             <a:r>
-              <a:rPr lang="ko-KR" altLang="en-US" sz="1200" b="1" dirty="0" smtClean="0">
+              <a:rPr lang="ko-KR" altLang="en-US" sz="1200" b="1" dirty="0">
                 <a:solidFill>
                   <a:schemeClr val="bg1"/>
                 </a:solidFill>
               </a:rPr>
               <a:t>학생지원</a:t>
             </a:r>
-            <a:endParaRPr lang="ko-KR" altLang="en-US" sz="1200" b="1" dirty="0">
-              <a:solidFill>
-                <a:schemeClr val="bg1"/>
-              </a:solidFill>
-            </a:endParaRPr>
           </a:p>
         </p:txBody>
       </p:sp>
@@ -8116,18 +7951,13 @@
           <a:p>
             <a:pPr algn="ctr"/>
             <a:r>
-              <a:rPr lang="ko-KR" altLang="en-US" sz="1200" b="1" dirty="0" smtClean="0">
+              <a:rPr lang="ko-KR" altLang="en-US" sz="1200" b="1" dirty="0">
                 <a:solidFill>
                   <a:schemeClr val="bg1"/>
                 </a:solidFill>
               </a:rPr>
               <a:t>취업지원</a:t>
             </a:r>
-            <a:endParaRPr lang="ko-KR" altLang="en-US" sz="1200" b="1" dirty="0">
-              <a:solidFill>
-                <a:schemeClr val="bg1"/>
-              </a:solidFill>
-            </a:endParaRPr>
           </a:p>
         </p:txBody>
       </p:sp>
@@ -8171,10 +8001,10 @@
           <a:p>
             <a:pPr algn="ctr"/>
             <a:r>
-              <a:rPr lang="ko-KR" altLang="en-US" sz="1200" dirty="0" smtClean="0"/>
+              <a:rPr lang="ko-KR" altLang="en-US" sz="1200" dirty="0"/>
               <a:t>교육센터 소개</a:t>
             </a:r>
-            <a:endParaRPr lang="en-US" altLang="ko-KR" sz="1200" dirty="0" smtClean="0"/>
+            <a:endParaRPr lang="en-US" altLang="ko-KR" sz="1200" dirty="0"/>
           </a:p>
         </p:txBody>
       </p:sp>
@@ -8201,7 +8031,7 @@
           <a:lstStyle/>
           <a:p>
             <a:r>
-              <a:rPr lang="en-US" altLang="ko-KR" sz="1600" dirty="0" smtClean="0">
+              <a:rPr lang="en-US" altLang="ko-KR" sz="1600" dirty="0">
                 <a:solidFill>
                   <a:schemeClr val="tx1">
                     <a:lumMod val="85000"/>
@@ -8212,7 +8042,7 @@
               <a:t>- </a:t>
             </a:r>
             <a:r>
-              <a:rPr lang="ko-KR" altLang="en-US" sz="1600" dirty="0" smtClean="0">
+              <a:rPr lang="ko-KR" altLang="en-US" sz="1600" dirty="0">
                 <a:solidFill>
                   <a:schemeClr val="tx1">
                     <a:lumMod val="85000"/>
@@ -8222,14 +8052,6 @@
               </a:rPr>
               <a:t>학원 홈페이지</a:t>
             </a:r>
-            <a:endParaRPr lang="ko-KR" altLang="en-US" sz="1600" dirty="0">
-              <a:solidFill>
-                <a:schemeClr val="tx1">
-                  <a:lumMod val="85000"/>
-                  <a:lumOff val="15000"/>
-                </a:schemeClr>
-              </a:solidFill>
-            </a:endParaRPr>
           </a:p>
         </p:txBody>
       </p:sp>
@@ -8273,10 +8095,9 @@
           <a:p>
             <a:pPr algn="ctr"/>
             <a:r>
-              <a:rPr lang="ko-KR" altLang="en-US" sz="1200" dirty="0" smtClean="0"/>
+              <a:rPr lang="ko-KR" altLang="en-US" sz="1200" dirty="0"/>
               <a:t>모집공고</a:t>
             </a:r>
-            <a:endParaRPr lang="ko-KR" altLang="en-US" sz="1200" dirty="0"/>
           </a:p>
         </p:txBody>
       </p:sp>
@@ -8318,18 +8139,13 @@
           <a:p>
             <a:pPr algn="ctr"/>
             <a:r>
-              <a:rPr lang="ko-KR" altLang="en-US" sz="1200" b="1" dirty="0" smtClean="0">
+              <a:rPr lang="ko-KR" altLang="en-US" sz="1200" b="1" dirty="0">
                 <a:solidFill>
                   <a:schemeClr val="bg1"/>
                 </a:solidFill>
               </a:rPr>
               <a:t>교육센터</a:t>
             </a:r>
-            <a:endParaRPr lang="ko-KR" altLang="en-US" sz="1200" b="1" dirty="0">
-              <a:solidFill>
-                <a:schemeClr val="bg1"/>
-              </a:solidFill>
-            </a:endParaRPr>
           </a:p>
         </p:txBody>
       </p:sp>
@@ -8373,10 +8189,9 @@
           <a:p>
             <a:pPr algn="ctr"/>
             <a:r>
-              <a:rPr lang="ko-KR" altLang="en-US" sz="1200" dirty="0" smtClean="0"/>
+              <a:rPr lang="ko-KR" altLang="en-US" sz="1200" dirty="0"/>
               <a:t>취업정보</a:t>
             </a:r>
-            <a:endParaRPr lang="ko-KR" altLang="en-US" sz="1200" dirty="0"/>
           </a:p>
         </p:txBody>
       </p:sp>
@@ -8420,10 +8235,9 @@
           <a:p>
             <a:pPr algn="ctr"/>
             <a:r>
-              <a:rPr lang="ko-KR" altLang="en-US" sz="1200" dirty="0" smtClean="0"/>
+              <a:rPr lang="ko-KR" altLang="en-US" sz="1200" dirty="0"/>
               <a:t>공지사항</a:t>
             </a:r>
-            <a:endParaRPr lang="ko-KR" altLang="en-US" sz="1200" dirty="0"/>
           </a:p>
         </p:txBody>
       </p:sp>
@@ -8470,7 +8284,6 @@
               <a:rPr lang="en-US" altLang="ko-KR" sz="1200" dirty="0"/>
               <a:t>FAQ</a:t>
             </a:r>
-            <a:endParaRPr lang="en-US" altLang="ko-KR" sz="1200" dirty="0" smtClean="0"/>
           </a:p>
         </p:txBody>
       </p:sp>
@@ -8512,7 +8325,7 @@
           <a:p>
             <a:pPr algn="ctr"/>
             <a:r>
-              <a:rPr lang="ko-KR" altLang="en-US" sz="1200" b="1" dirty="0" smtClean="0">
+              <a:rPr lang="ko-KR" altLang="en-US" sz="1200" b="1" dirty="0">
                 <a:solidFill>
                   <a:schemeClr val="bg1"/>
                 </a:solidFill>
@@ -8567,10 +8380,9 @@
           <a:p>
             <a:pPr algn="ctr"/>
             <a:r>
-              <a:rPr lang="ko-KR" altLang="en-US" sz="1200" dirty="0" smtClean="0"/>
+              <a:rPr lang="ko-KR" altLang="en-US" sz="1200" dirty="0"/>
               <a:t>나의 출결현황</a:t>
             </a:r>
-            <a:endParaRPr lang="ko-KR" altLang="en-US" sz="1200" dirty="0"/>
           </a:p>
         </p:txBody>
       </p:sp>
@@ -8597,7 +8409,7 @@
           <a:lstStyle/>
           <a:p>
             <a:r>
-              <a:rPr lang="en-US" altLang="ko-KR" sz="1600" dirty="0" smtClean="0">
+              <a:rPr lang="en-US" altLang="ko-KR" sz="1600" dirty="0">
                 <a:solidFill>
                   <a:schemeClr val="tx1">
                     <a:lumMod val="85000"/>
@@ -8608,7 +8420,7 @@
               <a:t>- LMS</a:t>
             </a:r>
             <a:r>
-              <a:rPr lang="ko-KR" altLang="en-US" sz="1600" dirty="0" smtClean="0">
+              <a:rPr lang="ko-KR" altLang="en-US" sz="1600" dirty="0">
                 <a:solidFill>
                   <a:schemeClr val="tx1">
                     <a:lumMod val="85000"/>
@@ -8618,14 +8430,6 @@
               </a:rPr>
               <a:t> 홈페이지</a:t>
             </a:r>
-            <a:endParaRPr lang="ko-KR" altLang="en-US" sz="1600" dirty="0">
-              <a:solidFill>
-                <a:schemeClr val="tx1">
-                  <a:lumMod val="85000"/>
-                  <a:lumOff val="15000"/>
-                </a:schemeClr>
-              </a:solidFill>
-            </a:endParaRPr>
           </a:p>
         </p:txBody>
       </p:sp>
@@ -8669,10 +8473,9 @@
           <a:p>
             <a:pPr algn="ctr"/>
             <a:r>
-              <a:rPr lang="ko-KR" altLang="en-US" sz="1200" dirty="0" smtClean="0"/>
+              <a:rPr lang="ko-KR" altLang="en-US" sz="1200" dirty="0"/>
               <a:t>나의 성적조회</a:t>
             </a:r>
-            <a:endParaRPr lang="ko-KR" altLang="en-US" sz="1200" dirty="0"/>
           </a:p>
         </p:txBody>
       </p:sp>
@@ -8714,18 +8517,13 @@
           <a:p>
             <a:pPr algn="ctr"/>
             <a:r>
-              <a:rPr lang="ko-KR" altLang="en-US" sz="1200" b="1" dirty="0" smtClean="0">
+              <a:rPr lang="ko-KR" altLang="en-US" sz="1200" b="1" dirty="0">
                 <a:solidFill>
                   <a:schemeClr val="bg1"/>
                 </a:solidFill>
               </a:rPr>
               <a:t>학생</a:t>
             </a:r>
-            <a:endParaRPr lang="ko-KR" altLang="en-US" sz="1200" b="1" dirty="0">
-              <a:solidFill>
-                <a:schemeClr val="bg1"/>
-              </a:solidFill>
-            </a:endParaRPr>
           </a:p>
         </p:txBody>
       </p:sp>
@@ -8769,10 +8567,10 @@
           <a:p>
             <a:pPr algn="ctr"/>
             <a:r>
-              <a:rPr lang="ko-KR" altLang="en-US" sz="1200" dirty="0" smtClean="0"/>
+              <a:rPr lang="ko-KR" altLang="en-US" sz="1200" dirty="0"/>
               <a:t>나의 강의정보</a:t>
             </a:r>
-            <a:endParaRPr lang="en-US" altLang="ko-KR" sz="1200" dirty="0" smtClean="0"/>
+            <a:endParaRPr lang="en-US" altLang="ko-KR" sz="1200" dirty="0"/>
           </a:p>
         </p:txBody>
       </p:sp>
@@ -8816,7 +8614,7 @@
           <a:p>
             <a:pPr algn="ctr"/>
             <a:r>
-              <a:rPr lang="ko-KR" altLang="en-US" sz="1200" dirty="0" smtClean="0"/>
+              <a:rPr lang="ko-KR" altLang="en-US" sz="1200" dirty="0"/>
               <a:t>수강신청</a:t>
             </a:r>
             <a:r>
@@ -8824,10 +8622,10 @@
               <a:t> </a:t>
             </a:r>
             <a:r>
-              <a:rPr lang="ko-KR" altLang="en-US" sz="1200" dirty="0" smtClean="0"/>
+              <a:rPr lang="ko-KR" altLang="en-US" sz="1200" dirty="0"/>
               <a:t>관리</a:t>
             </a:r>
-            <a:endParaRPr lang="en-US" altLang="ko-KR" sz="1200" dirty="0" smtClean="0"/>
+            <a:endParaRPr lang="en-US" altLang="ko-KR" sz="1200" dirty="0"/>
           </a:p>
         </p:txBody>
       </p:sp>
@@ -8869,18 +8667,13 @@
           <a:p>
             <a:pPr algn="ctr"/>
             <a:r>
-              <a:rPr lang="ko-KR" altLang="en-US" sz="1200" b="1" dirty="0" smtClean="0">
+              <a:rPr lang="ko-KR" altLang="en-US" sz="1200" b="1" dirty="0">
                 <a:solidFill>
                   <a:schemeClr val="bg1"/>
                 </a:solidFill>
               </a:rPr>
               <a:t>강사</a:t>
             </a:r>
-            <a:endParaRPr lang="ko-KR" altLang="en-US" sz="1200" b="1" dirty="0">
-              <a:solidFill>
-                <a:schemeClr val="bg1"/>
-              </a:solidFill>
-            </a:endParaRPr>
           </a:p>
         </p:txBody>
       </p:sp>
@@ -8924,10 +8717,10 @@
           <a:p>
             <a:pPr algn="ctr"/>
             <a:r>
-              <a:rPr lang="ko-KR" altLang="en-US" sz="1200" dirty="0" smtClean="0"/>
+              <a:rPr lang="ko-KR" altLang="en-US" sz="1200" dirty="0"/>
               <a:t>성적관리</a:t>
             </a:r>
-            <a:endParaRPr lang="en-US" altLang="ko-KR" sz="1200" dirty="0" smtClean="0"/>
+            <a:endParaRPr lang="en-US" altLang="ko-KR" sz="1200" dirty="0"/>
           </a:p>
         </p:txBody>
       </p:sp>
@@ -8971,7 +8764,7 @@
           <a:p>
             <a:pPr algn="ctr"/>
             <a:r>
-              <a:rPr lang="ko-KR" altLang="en-US" sz="1200" dirty="0" smtClean="0"/>
+              <a:rPr lang="ko-KR" altLang="en-US" sz="1200" dirty="0"/>
               <a:t>회원정보</a:t>
             </a:r>
             <a:r>
@@ -8979,10 +8772,10 @@
               <a:t> </a:t>
             </a:r>
             <a:r>
-              <a:rPr lang="ko-KR" altLang="en-US" sz="1200" dirty="0" smtClean="0"/>
+              <a:rPr lang="ko-KR" altLang="en-US" sz="1200" dirty="0"/>
               <a:t>수정</a:t>
             </a:r>
-            <a:endParaRPr lang="en-US" altLang="ko-KR" sz="1200" dirty="0" smtClean="0"/>
+            <a:endParaRPr lang="en-US" altLang="ko-KR" sz="1200" dirty="0"/>
           </a:p>
         </p:txBody>
       </p:sp>
@@ -9024,18 +8817,13 @@
           <a:p>
             <a:pPr algn="ctr"/>
             <a:r>
-              <a:rPr lang="ko-KR" altLang="en-US" sz="1200" b="1" dirty="0" smtClean="0">
+              <a:rPr lang="ko-KR" altLang="en-US" sz="1200" b="1" dirty="0">
                 <a:solidFill>
                   <a:schemeClr val="bg1"/>
                 </a:solidFill>
               </a:rPr>
               <a:t>행정</a:t>
             </a:r>
-            <a:endParaRPr lang="ko-KR" altLang="en-US" sz="1200" b="1" dirty="0">
-              <a:solidFill>
-                <a:schemeClr val="bg1"/>
-              </a:solidFill>
-            </a:endParaRPr>
           </a:p>
         </p:txBody>
       </p:sp>
@@ -9079,7 +8867,7 @@
           <a:p>
             <a:pPr algn="ctr"/>
             <a:r>
-              <a:rPr lang="ko-KR" altLang="en-US" sz="1200" dirty="0" smtClean="0"/>
+              <a:rPr lang="ko-KR" altLang="en-US" sz="1200" dirty="0"/>
               <a:t>회원관리</a:t>
             </a:r>
             <a:endParaRPr lang="en-US" altLang="ko-KR" sz="1200" dirty="0"/>
@@ -9126,7 +8914,7 @@
           <a:p>
             <a:pPr algn="ctr"/>
             <a:r>
-              <a:rPr lang="ko-KR" altLang="en-US" sz="1200" dirty="0" smtClean="0"/>
+              <a:rPr lang="ko-KR" altLang="en-US" sz="1200" dirty="0"/>
               <a:t>교육과정</a:t>
             </a:r>
             <a:r>
@@ -9134,7 +8922,7 @@
               <a:t> </a:t>
             </a:r>
             <a:r>
-              <a:rPr lang="ko-KR" altLang="en-US" sz="1200" dirty="0" smtClean="0"/>
+              <a:rPr lang="ko-KR" altLang="en-US" sz="1200" dirty="0"/>
               <a:t>관리</a:t>
             </a:r>
             <a:endParaRPr lang="en-US" altLang="ko-KR" sz="1200" dirty="0"/>
@@ -9181,10 +8969,10 @@
           <a:p>
             <a:pPr algn="ctr"/>
             <a:r>
-              <a:rPr lang="ko-KR" altLang="en-US" sz="1200" dirty="0" smtClean="0"/>
+              <a:rPr lang="ko-KR" altLang="en-US" sz="1200" dirty="0"/>
               <a:t>시험관리</a:t>
             </a:r>
-            <a:endParaRPr lang="en-US" altLang="ko-KR" sz="1200" dirty="0" smtClean="0"/>
+            <a:endParaRPr lang="en-US" altLang="ko-KR" sz="1200" dirty="0"/>
           </a:p>
         </p:txBody>
       </p:sp>
@@ -9228,10 +9016,9 @@
           <a:p>
             <a:pPr algn="ctr"/>
             <a:r>
-              <a:rPr lang="ko-KR" altLang="en-US" sz="1200" dirty="0" smtClean="0"/>
+              <a:rPr lang="ko-KR" altLang="en-US" sz="1200" dirty="0"/>
               <a:t>게시판 관리</a:t>
             </a:r>
-            <a:endParaRPr lang="ko-KR" altLang="en-US" sz="1200" dirty="0"/>
           </a:p>
         </p:txBody>
       </p:sp>
@@ -9275,10 +9062,10 @@
           <a:p>
             <a:pPr algn="ctr"/>
             <a:r>
-              <a:rPr lang="ko-KR" altLang="en-US" sz="1200" dirty="0" smtClean="0"/>
+              <a:rPr lang="ko-KR" altLang="en-US" sz="1200" dirty="0"/>
               <a:t>모집공고</a:t>
             </a:r>
-            <a:endParaRPr lang="en-US" altLang="ko-KR" sz="1200" dirty="0" smtClean="0"/>
+            <a:endParaRPr lang="en-US" altLang="ko-KR" sz="1200" dirty="0"/>
           </a:p>
         </p:txBody>
       </p:sp>
@@ -9305,7 +9092,7 @@
           <a:lstStyle/>
           <a:p>
             <a:r>
-              <a:rPr lang="ko-KR" altLang="en-US" sz="2000" b="1" dirty="0" smtClean="0">
+              <a:rPr lang="ko-KR" altLang="en-US" sz="2000" b="1" dirty="0">
                 <a:solidFill>
                   <a:schemeClr val="tx1">
                     <a:lumMod val="85000"/>
@@ -9316,7 +9103,7 @@
               <a:t>메뉴설계 </a:t>
             </a:r>
             <a:r>
-              <a:rPr lang="en-US" altLang="ko-KR" sz="2000" b="1" dirty="0" smtClean="0">
+              <a:rPr lang="en-US" altLang="ko-KR" sz="2000" b="1" dirty="0">
                 <a:solidFill>
                   <a:schemeClr val="tx1">
                     <a:lumMod val="85000"/>
@@ -9446,7 +9233,7 @@
           <a:lstStyle/>
           <a:p>
             <a:r>
-              <a:rPr lang="en-US" altLang="ko-KR" sz="2000" b="1" dirty="0" smtClean="0">
+              <a:rPr lang="en-US" altLang="ko-KR" sz="2000" b="1" dirty="0">
                 <a:solidFill>
                   <a:schemeClr val="bg1"/>
                 </a:solidFill>
@@ -9496,7 +9283,7 @@
           <a:p>
             <a:pPr algn="ctr"/>
             <a:r>
-              <a:rPr lang="ko-KR" altLang="en-US" sz="1200" dirty="0" smtClean="0"/>
+              <a:rPr lang="ko-KR" altLang="en-US" sz="1200" dirty="0"/>
               <a:t>학원정보관리</a:t>
             </a:r>
             <a:endParaRPr lang="en-US" altLang="ko-KR" sz="1200" dirty="0"/>
@@ -9556,7 +9343,7 @@
           <a:lstStyle/>
           <a:p>
             <a:r>
-              <a:rPr lang="ko-KR" altLang="en-US" sz="2000" b="1" dirty="0" smtClean="0">
+              <a:rPr lang="ko-KR" altLang="en-US" sz="2000" b="1" dirty="0">
                 <a:solidFill>
                   <a:schemeClr val="tx1">
                     <a:lumMod val="85000"/>
@@ -9567,7 +9354,7 @@
               <a:t>메뉴설계 </a:t>
             </a:r>
             <a:r>
-              <a:rPr lang="en-US" altLang="ko-KR" sz="2000" b="1" dirty="0" smtClean="0">
+              <a:rPr lang="en-US" altLang="ko-KR" sz="2000" b="1" dirty="0">
                 <a:solidFill>
                   <a:schemeClr val="tx1">
                     <a:lumMod val="85000"/>
@@ -9697,7 +9484,7 @@
           <a:lstStyle/>
           <a:p>
             <a:r>
-              <a:rPr lang="en-US" altLang="ko-KR" sz="2000" b="1" dirty="0" smtClean="0">
+              <a:rPr lang="en-US" altLang="ko-KR" sz="2000" b="1" dirty="0">
                 <a:solidFill>
                   <a:schemeClr val="bg1"/>
                 </a:solidFill>
@@ -9798,18 +9585,13 @@
           <a:p>
             <a:pPr algn="ctr"/>
             <a:r>
-              <a:rPr lang="ko-KR" altLang="en-US" sz="1200" b="1" dirty="0" smtClean="0">
+              <a:rPr lang="ko-KR" altLang="en-US" sz="1200" b="1" dirty="0">
                 <a:solidFill>
                   <a:schemeClr val="bg1"/>
                 </a:solidFill>
               </a:rPr>
               <a:t>학생지원</a:t>
             </a:r>
-            <a:endParaRPr lang="ko-KR" altLang="en-US" sz="1200" b="1" dirty="0">
-              <a:solidFill>
-                <a:schemeClr val="bg1"/>
-              </a:solidFill>
-            </a:endParaRPr>
           </a:p>
         </p:txBody>
       </p:sp>
@@ -9851,18 +9633,13 @@
           <a:p>
             <a:pPr algn="ctr"/>
             <a:r>
-              <a:rPr lang="ko-KR" altLang="en-US" sz="1200" b="1" dirty="0" smtClean="0">
+              <a:rPr lang="ko-KR" altLang="en-US" sz="1200" b="1" dirty="0">
                 <a:solidFill>
                   <a:schemeClr val="bg1"/>
                 </a:solidFill>
               </a:rPr>
               <a:t>취업지원</a:t>
             </a:r>
-            <a:endParaRPr lang="ko-KR" altLang="en-US" sz="1200" b="1" dirty="0">
-              <a:solidFill>
-                <a:schemeClr val="bg1"/>
-              </a:solidFill>
-            </a:endParaRPr>
           </a:p>
         </p:txBody>
       </p:sp>
@@ -9906,10 +9683,10 @@
           <a:p>
             <a:pPr algn="ctr"/>
             <a:r>
-              <a:rPr lang="ko-KR" altLang="en-US" sz="1200" dirty="0" smtClean="0"/>
+              <a:rPr lang="ko-KR" altLang="en-US" sz="1200" dirty="0"/>
               <a:t>입학안내</a:t>
             </a:r>
-            <a:endParaRPr lang="en-US" altLang="ko-KR" sz="1200" dirty="0" smtClean="0"/>
+            <a:endParaRPr lang="en-US" altLang="ko-KR" sz="1200" dirty="0"/>
           </a:p>
         </p:txBody>
       </p:sp>
@@ -9953,10 +9730,9 @@
           <a:p>
             <a:pPr algn="ctr"/>
             <a:r>
-              <a:rPr lang="ko-KR" altLang="en-US" sz="1200" dirty="0" smtClean="0"/>
+              <a:rPr lang="ko-KR" altLang="en-US" sz="1200" dirty="0"/>
               <a:t>오시는 길</a:t>
             </a:r>
-            <a:endParaRPr lang="ko-KR" altLang="en-US" sz="1200" dirty="0"/>
           </a:p>
         </p:txBody>
       </p:sp>
@@ -9983,7 +9759,7 @@
           <a:lstStyle/>
           <a:p>
             <a:r>
-              <a:rPr lang="en-US" altLang="ko-KR" sz="1600" dirty="0" smtClean="0">
+              <a:rPr lang="en-US" altLang="ko-KR" sz="1600" dirty="0">
                 <a:solidFill>
                   <a:schemeClr val="tx1">
                     <a:lumMod val="85000"/>
@@ -9994,7 +9770,7 @@
               <a:t>- </a:t>
             </a:r>
             <a:r>
-              <a:rPr lang="ko-KR" altLang="en-US" sz="1600" dirty="0" smtClean="0">
+              <a:rPr lang="ko-KR" altLang="en-US" sz="1600" dirty="0">
                 <a:solidFill>
                   <a:schemeClr val="tx1">
                     <a:lumMod val="85000"/>
@@ -10004,14 +9780,6 @@
               </a:rPr>
               <a:t>학원 홈페이지</a:t>
             </a:r>
-            <a:endParaRPr lang="ko-KR" altLang="en-US" sz="1600" dirty="0">
-              <a:solidFill>
-                <a:schemeClr val="tx1">
-                  <a:lumMod val="85000"/>
-                  <a:lumOff val="15000"/>
-                </a:schemeClr>
-              </a:solidFill>
-            </a:endParaRPr>
           </a:p>
         </p:txBody>
       </p:sp>
@@ -10055,7 +9823,7 @@
           <a:p>
             <a:pPr algn="ctr"/>
             <a:r>
-              <a:rPr lang="ko-KR" altLang="en-US" sz="1200" dirty="0" smtClean="0"/>
+              <a:rPr lang="ko-KR" altLang="en-US" sz="1200" dirty="0"/>
               <a:t>교육과정</a:t>
             </a:r>
             <a:r>
@@ -10063,10 +9831,9 @@
               <a:t> </a:t>
             </a:r>
             <a:r>
-              <a:rPr lang="ko-KR" altLang="en-US" sz="1200" dirty="0" smtClean="0"/>
+              <a:rPr lang="ko-KR" altLang="en-US" sz="1200" dirty="0"/>
               <a:t>소개</a:t>
             </a:r>
-            <a:endParaRPr lang="ko-KR" altLang="en-US" sz="1200" dirty="0"/>
           </a:p>
         </p:txBody>
       </p:sp>
@@ -10110,10 +9877,9 @@
           <a:p>
             <a:pPr algn="ctr"/>
             <a:r>
-              <a:rPr lang="ko-KR" altLang="en-US" sz="1200" dirty="0" smtClean="0"/>
+              <a:rPr lang="ko-KR" altLang="en-US" sz="1200" dirty="0"/>
               <a:t>교육과정 신청</a:t>
             </a:r>
-            <a:endParaRPr lang="ko-KR" altLang="en-US" sz="1200" dirty="0"/>
           </a:p>
         </p:txBody>
       </p:sp>
@@ -10155,18 +9921,13 @@
           <a:p>
             <a:pPr algn="ctr"/>
             <a:r>
-              <a:rPr lang="ko-KR" altLang="en-US" sz="1200" b="1" dirty="0" smtClean="0">
+              <a:rPr lang="ko-KR" altLang="en-US" sz="1200" b="1" dirty="0">
                 <a:solidFill>
                   <a:schemeClr val="bg1"/>
                 </a:solidFill>
               </a:rPr>
               <a:t>교육센터</a:t>
             </a:r>
-            <a:endParaRPr lang="ko-KR" altLang="en-US" sz="1200" b="1" dirty="0">
-              <a:solidFill>
-                <a:schemeClr val="bg1"/>
-              </a:solidFill>
-            </a:endParaRPr>
           </a:p>
         </p:txBody>
       </p:sp>
@@ -10210,10 +9971,9 @@
           <a:p>
             <a:pPr algn="ctr"/>
             <a:r>
-              <a:rPr lang="ko-KR" altLang="en-US" sz="1200" dirty="0" smtClean="0"/>
+              <a:rPr lang="ko-KR" altLang="en-US" sz="1200" dirty="0"/>
               <a:t>취업정보</a:t>
             </a:r>
-            <a:endParaRPr lang="ko-KR" altLang="en-US" sz="1200" dirty="0"/>
           </a:p>
         </p:txBody>
       </p:sp>
@@ -10257,10 +10017,9 @@
           <a:p>
             <a:pPr algn="ctr"/>
             <a:r>
-              <a:rPr lang="ko-KR" altLang="en-US" sz="1200" dirty="0" smtClean="0"/>
+              <a:rPr lang="ko-KR" altLang="en-US" sz="1200" dirty="0"/>
               <a:t>공지사항</a:t>
             </a:r>
-            <a:endParaRPr lang="ko-KR" altLang="en-US" sz="1200" dirty="0"/>
           </a:p>
         </p:txBody>
       </p:sp>
@@ -10307,7 +10066,6 @@
               <a:rPr lang="en-US" altLang="ko-KR" sz="1200" dirty="0"/>
               <a:t>FAQ</a:t>
             </a:r>
-            <a:endParaRPr lang="en-US" altLang="ko-KR" sz="1200" dirty="0" smtClean="0"/>
           </a:p>
         </p:txBody>
       </p:sp>
@@ -10349,7 +10107,7 @@
           <a:p>
             <a:pPr algn="ctr"/>
             <a:r>
-              <a:rPr lang="ko-KR" altLang="en-US" sz="1200" b="1" dirty="0" smtClean="0">
+              <a:rPr lang="ko-KR" altLang="en-US" sz="1200" b="1" dirty="0">
                 <a:solidFill>
                   <a:schemeClr val="bg1"/>
                 </a:solidFill>
@@ -10404,10 +10162,9 @@
           <a:p>
             <a:pPr algn="ctr"/>
             <a:r>
-              <a:rPr lang="ko-KR" altLang="en-US" sz="1200" dirty="0" smtClean="0"/>
+              <a:rPr lang="ko-KR" altLang="en-US" sz="1200" dirty="0"/>
               <a:t>나의 출결현황</a:t>
             </a:r>
-            <a:endParaRPr lang="ko-KR" altLang="en-US" sz="1200" dirty="0"/>
           </a:p>
         </p:txBody>
       </p:sp>
@@ -10434,7 +10191,7 @@
           <a:lstStyle/>
           <a:p>
             <a:r>
-              <a:rPr lang="en-US" altLang="ko-KR" sz="1600" dirty="0" smtClean="0">
+              <a:rPr lang="en-US" altLang="ko-KR" sz="1600" dirty="0">
                 <a:solidFill>
                   <a:schemeClr val="tx1">
                     <a:lumMod val="85000"/>
@@ -10445,7 +10202,7 @@
               <a:t>- LMS</a:t>
             </a:r>
             <a:r>
-              <a:rPr lang="ko-KR" altLang="en-US" sz="1600" dirty="0" smtClean="0">
+              <a:rPr lang="ko-KR" altLang="en-US" sz="1600" dirty="0">
                 <a:solidFill>
                   <a:schemeClr val="tx1">
                     <a:lumMod val="85000"/>
@@ -10455,14 +10212,6 @@
               </a:rPr>
               <a:t> 홈페이지</a:t>
             </a:r>
-            <a:endParaRPr lang="ko-KR" altLang="en-US" sz="1600" dirty="0">
-              <a:solidFill>
-                <a:schemeClr val="tx1">
-                  <a:lumMod val="85000"/>
-                  <a:lumOff val="15000"/>
-                </a:schemeClr>
-              </a:solidFill>
-            </a:endParaRPr>
           </a:p>
         </p:txBody>
       </p:sp>
@@ -10506,10 +10255,9 @@
           <a:p>
             <a:pPr algn="ctr"/>
             <a:r>
-              <a:rPr lang="ko-KR" altLang="en-US" sz="1200" dirty="0" smtClean="0"/>
+              <a:rPr lang="ko-KR" altLang="en-US" sz="1200" dirty="0"/>
               <a:t>나의 성적조회</a:t>
             </a:r>
-            <a:endParaRPr lang="ko-KR" altLang="en-US" sz="1200" dirty="0"/>
           </a:p>
         </p:txBody>
       </p:sp>
@@ -10551,18 +10299,13 @@
           <a:p>
             <a:pPr algn="ctr"/>
             <a:r>
-              <a:rPr lang="ko-KR" altLang="en-US" sz="1200" b="1" dirty="0" smtClean="0">
+              <a:rPr lang="ko-KR" altLang="en-US" sz="1200" b="1" dirty="0">
                 <a:solidFill>
                   <a:schemeClr val="bg1"/>
                 </a:solidFill>
               </a:rPr>
               <a:t>학생</a:t>
             </a:r>
-            <a:endParaRPr lang="ko-KR" altLang="en-US" sz="1200" b="1" dirty="0">
-              <a:solidFill>
-                <a:schemeClr val="bg1"/>
-              </a:solidFill>
-            </a:endParaRPr>
           </a:p>
         </p:txBody>
       </p:sp>
@@ -10606,10 +10349,10 @@
           <a:p>
             <a:pPr algn="ctr"/>
             <a:r>
-              <a:rPr lang="ko-KR" altLang="en-US" sz="1200" dirty="0" smtClean="0"/>
+              <a:rPr lang="ko-KR" altLang="en-US" sz="1200" dirty="0"/>
               <a:t>나의 강의정보</a:t>
             </a:r>
-            <a:endParaRPr lang="en-US" altLang="ko-KR" sz="1200" dirty="0" smtClean="0"/>
+            <a:endParaRPr lang="en-US" altLang="ko-KR" sz="1200" dirty="0"/>
           </a:p>
         </p:txBody>
       </p:sp>
@@ -10653,7 +10396,7 @@
           <a:p>
             <a:pPr algn="ctr"/>
             <a:r>
-              <a:rPr lang="ko-KR" altLang="en-US" sz="1200" dirty="0" smtClean="0"/>
+              <a:rPr lang="ko-KR" altLang="en-US" sz="1200" dirty="0"/>
               <a:t>수강신청</a:t>
             </a:r>
             <a:r>
@@ -10661,10 +10404,10 @@
               <a:t> </a:t>
             </a:r>
             <a:r>
-              <a:rPr lang="ko-KR" altLang="en-US" sz="1200" dirty="0" smtClean="0"/>
+              <a:rPr lang="ko-KR" altLang="en-US" sz="1200" dirty="0"/>
               <a:t>관리</a:t>
             </a:r>
-            <a:endParaRPr lang="en-US" altLang="ko-KR" sz="1200" dirty="0" smtClean="0"/>
+            <a:endParaRPr lang="en-US" altLang="ko-KR" sz="1200" dirty="0"/>
           </a:p>
         </p:txBody>
       </p:sp>
@@ -10708,10 +10451,10 @@
           <a:p>
             <a:pPr algn="ctr"/>
             <a:r>
-              <a:rPr lang="ko-KR" altLang="en-US" sz="1200" dirty="0" smtClean="0"/>
+              <a:rPr lang="ko-KR" altLang="en-US" sz="1200" dirty="0"/>
               <a:t>교육과정 조회</a:t>
             </a:r>
-            <a:endParaRPr lang="en-US" altLang="ko-KR" sz="1200" dirty="0" smtClean="0"/>
+            <a:endParaRPr lang="en-US" altLang="ko-KR" sz="1200" dirty="0"/>
           </a:p>
         </p:txBody>
       </p:sp>
@@ -10753,18 +10496,13 @@
           <a:p>
             <a:pPr algn="ctr"/>
             <a:r>
-              <a:rPr lang="ko-KR" altLang="en-US" sz="1200" b="1" dirty="0" smtClean="0">
+              <a:rPr lang="ko-KR" altLang="en-US" sz="1200" b="1" dirty="0">
                 <a:solidFill>
                   <a:schemeClr val="bg1"/>
                 </a:solidFill>
               </a:rPr>
               <a:t>강사</a:t>
             </a:r>
-            <a:endParaRPr lang="ko-KR" altLang="en-US" sz="1200" b="1" dirty="0">
-              <a:solidFill>
-                <a:schemeClr val="bg1"/>
-              </a:solidFill>
-            </a:endParaRPr>
           </a:p>
         </p:txBody>
       </p:sp>
@@ -10808,10 +10546,10 @@
           <a:p>
             <a:pPr algn="ctr"/>
             <a:r>
-              <a:rPr lang="ko-KR" altLang="en-US" sz="1200" dirty="0" smtClean="0"/>
+              <a:rPr lang="ko-KR" altLang="en-US" sz="1200" dirty="0"/>
               <a:t>성적관리</a:t>
             </a:r>
-            <a:endParaRPr lang="en-US" altLang="ko-KR" sz="1200" dirty="0" smtClean="0"/>
+            <a:endParaRPr lang="en-US" altLang="ko-KR" sz="1200" dirty="0"/>
           </a:p>
         </p:txBody>
       </p:sp>
@@ -10855,7 +10593,7 @@
           <a:p>
             <a:pPr algn="ctr"/>
             <a:r>
-              <a:rPr lang="ko-KR" altLang="en-US" sz="1200" dirty="0" smtClean="0"/>
+              <a:rPr lang="ko-KR" altLang="en-US" sz="1200" dirty="0"/>
               <a:t>회원정보</a:t>
             </a:r>
             <a:r>
@@ -10863,10 +10601,10 @@
               <a:t> </a:t>
             </a:r>
             <a:r>
-              <a:rPr lang="ko-KR" altLang="en-US" sz="1200" dirty="0" smtClean="0"/>
+              <a:rPr lang="ko-KR" altLang="en-US" sz="1200" dirty="0"/>
               <a:t>수정</a:t>
             </a:r>
-            <a:endParaRPr lang="en-US" altLang="ko-KR" sz="1200" dirty="0" smtClean="0"/>
+            <a:endParaRPr lang="en-US" altLang="ko-KR" sz="1200" dirty="0"/>
           </a:p>
         </p:txBody>
       </p:sp>
@@ -10908,18 +10646,13 @@
           <a:p>
             <a:pPr algn="ctr"/>
             <a:r>
-              <a:rPr lang="ko-KR" altLang="en-US" sz="1200" b="1" dirty="0" smtClean="0">
+              <a:rPr lang="ko-KR" altLang="en-US" sz="1200" b="1" dirty="0">
                 <a:solidFill>
                   <a:schemeClr val="bg1"/>
                 </a:solidFill>
               </a:rPr>
               <a:t>행정</a:t>
             </a:r>
-            <a:endParaRPr lang="ko-KR" altLang="en-US" sz="1200" b="1" dirty="0">
-              <a:solidFill>
-                <a:schemeClr val="bg1"/>
-              </a:solidFill>
-            </a:endParaRPr>
           </a:p>
         </p:txBody>
       </p:sp>
@@ -10963,7 +10696,7 @@
           <a:p>
             <a:pPr algn="ctr"/>
             <a:r>
-              <a:rPr lang="ko-KR" altLang="en-US" sz="1200" dirty="0" smtClean="0"/>
+              <a:rPr lang="ko-KR" altLang="en-US" sz="1200" dirty="0"/>
               <a:t>회원관리</a:t>
             </a:r>
             <a:endParaRPr lang="en-US" altLang="ko-KR" sz="1200" dirty="0"/>
@@ -11010,7 +10743,7 @@
           <a:p>
             <a:pPr algn="ctr"/>
             <a:r>
-              <a:rPr lang="ko-KR" altLang="en-US" sz="1200" dirty="0" smtClean="0"/>
+              <a:rPr lang="ko-KR" altLang="en-US" sz="1200" dirty="0"/>
               <a:t>교육과정</a:t>
             </a:r>
             <a:r>
@@ -11018,7 +10751,7 @@
               <a:t> </a:t>
             </a:r>
             <a:r>
-              <a:rPr lang="ko-KR" altLang="en-US" sz="1200" dirty="0" smtClean="0"/>
+              <a:rPr lang="ko-KR" altLang="en-US" sz="1200" dirty="0"/>
               <a:t>관리</a:t>
             </a:r>
             <a:endParaRPr lang="en-US" altLang="ko-KR" sz="1200" dirty="0"/>
@@ -11065,7 +10798,7 @@
           <a:p>
             <a:pPr algn="ctr"/>
             <a:r>
-              <a:rPr lang="ko-KR" altLang="en-US" sz="1200" dirty="0" smtClean="0"/>
+              <a:rPr lang="ko-KR" altLang="en-US" sz="1200" dirty="0"/>
               <a:t>학원정보관리</a:t>
             </a:r>
             <a:endParaRPr lang="en-US" altLang="ko-KR" sz="1200" dirty="0"/>
@@ -11112,10 +10845,10 @@
           <a:p>
             <a:pPr algn="ctr"/>
             <a:r>
-              <a:rPr lang="ko-KR" altLang="en-US" sz="1200" dirty="0" smtClean="0"/>
+              <a:rPr lang="ko-KR" altLang="en-US" sz="1200" dirty="0"/>
               <a:t>시험관리</a:t>
             </a:r>
-            <a:endParaRPr lang="en-US" altLang="ko-KR" sz="1200" dirty="0" smtClean="0"/>
+            <a:endParaRPr lang="en-US" altLang="ko-KR" sz="1200" dirty="0"/>
           </a:p>
         </p:txBody>
       </p:sp>
@@ -11159,10 +10892,9 @@
           <a:p>
             <a:pPr algn="ctr"/>
             <a:r>
-              <a:rPr lang="ko-KR" altLang="en-US" sz="1200" dirty="0" smtClean="0"/>
+              <a:rPr lang="ko-KR" altLang="en-US" sz="1200" dirty="0"/>
               <a:t>게시판 관리</a:t>
             </a:r>
-            <a:endParaRPr lang="ko-KR" altLang="en-US" sz="1200" dirty="0"/>
           </a:p>
         </p:txBody>
       </p:sp>
@@ -11206,10 +10938,10 @@
           <a:p>
             <a:pPr algn="ctr"/>
             <a:r>
-              <a:rPr lang="ko-KR" altLang="en-US" sz="1200" dirty="0" smtClean="0"/>
+              <a:rPr lang="ko-KR" altLang="en-US" sz="1200" dirty="0"/>
               <a:t>수강신청</a:t>
             </a:r>
-            <a:endParaRPr lang="en-US" altLang="ko-KR" sz="1200" dirty="0" smtClean="0"/>
+            <a:endParaRPr lang="en-US" altLang="ko-KR" sz="1200" dirty="0"/>
           </a:p>
         </p:txBody>
       </p:sp>
@@ -11223,14 +10955,6 @@
   <p:clrMapOvr>
     <a:masterClrMapping/>
   </p:clrMapOvr>
-  <mc:AlternateContent xmlns:mc="http://schemas.openxmlformats.org/markup-compatibility/2006" xmlns:p14="http://schemas.microsoft.com/office/powerpoint/2010/main">
-    <mc:Choice Requires="p14">
-      <p:transition spd="slow" p14:dur="2000"/>
-    </mc:Choice>
-    <mc:Fallback xmlns="">
-      <p:transition spd="slow"/>
-    </mc:Fallback>
-  </mc:AlternateContent>
 </p:sld>
 </file>
 

</xml_diff>